<commit_message>
spring security basic examples, and slides
</commit_message>
<xml_diff>
--- a/documentation/SpringBoot.pptx
+++ b/documentation/SpringBoot.pptx
@@ -32,8 +32,10 @@
     <p:sldId id="275" r:id="rId26"/>
     <p:sldId id="286" r:id="rId27"/>
     <p:sldId id="287" r:id="rId28"/>
-    <p:sldId id="274" r:id="rId29"/>
-    <p:sldId id="285" r:id="rId30"/>
+    <p:sldId id="288" r:id="rId29"/>
+    <p:sldId id="289" r:id="rId30"/>
+    <p:sldId id="274" r:id="rId31"/>
+    <p:sldId id="285" r:id="rId32"/>
   </p:sldIdLst>
   <p:sldSz cx="12192000" cy="6858000"/>
   <p:notesSz cx="6858000" cy="9144000"/>
@@ -164,6 +166,8 @@
             <p14:sldId id="275"/>
             <p14:sldId id="286"/>
             <p14:sldId id="287"/>
+            <p14:sldId id="288"/>
+            <p14:sldId id="289"/>
           </p14:sldIdLst>
         </p14:section>
         <p14:section name="Popups" id="{0E31B68C-B07E-4497-B09D-B16B0C92DA63}">
@@ -15987,12 +15991,267 @@
           <a:p>
             <a:r>
               <a:rPr lang="en-US" dirty="0"/>
-              <a:t>How to enable it?</a:t>
+              <a:t>How to enable</a:t>
             </a:r>
           </a:p>
           <a:p>
             <a:pPr lvl="1"/>
-            <a:endParaRPr lang="en-US" dirty="0"/>
+            <a:r>
+              <a:rPr lang="en-US" dirty="0"/>
+              <a:t>Include dependency: `</a:t>
+            </a:r>
+            <a:r>
+              <a:rPr lang="en-US" dirty="0">
+                <a:solidFill>
+                  <a:schemeClr val="accent1">
+                    <a:lumMod val="60000"/>
+                    <a:lumOff val="40000"/>
+                  </a:schemeClr>
+                </a:solidFill>
+              </a:rPr>
+              <a:t>spring-boot-starter-security</a:t>
+            </a:r>
+            <a:r>
+              <a:rPr lang="en-US" dirty="0"/>
+              <a:t>`</a:t>
+            </a:r>
+          </a:p>
+          <a:p>
+            <a:pPr lvl="2"/>
+            <a:r>
+              <a:rPr lang="en-US" dirty="0"/>
+              <a:t>Default configuration is loaded.</a:t>
+            </a:r>
+          </a:p>
+          <a:p>
+            <a:pPr lvl="3"/>
+            <a:r>
+              <a:rPr lang="en-US" dirty="0"/>
+              <a:t> Default user: </a:t>
+            </a:r>
+            <a:r>
+              <a:rPr lang="en-US" dirty="0">
+                <a:solidFill>
+                  <a:schemeClr val="accent1">
+                    <a:lumMod val="60000"/>
+                    <a:lumOff val="40000"/>
+                  </a:schemeClr>
+                </a:solidFill>
+              </a:rPr>
+              <a:t>user </a:t>
+            </a:r>
+          </a:p>
+          <a:p>
+            <a:pPr lvl="3"/>
+            <a:r>
+              <a:rPr lang="en-US" dirty="0">
+                <a:solidFill>
+                  <a:schemeClr val="tx1"/>
+                </a:solidFill>
+              </a:rPr>
+              <a:t>Default password: it is generated during start, and printed in console.</a:t>
+            </a:r>
+          </a:p>
+          <a:p>
+            <a:pPr lvl="2"/>
+            <a:r>
+              <a:rPr lang="en-US" dirty="0"/>
+              <a:t>Security is applied on all rest services</a:t>
+            </a:r>
+          </a:p>
+          <a:p>
+            <a:pPr lvl="1"/>
+            <a:r>
+              <a:rPr lang="en-US" dirty="0">
+                <a:solidFill>
+                  <a:schemeClr val="tx1"/>
+                </a:solidFill>
+              </a:rPr>
+              <a:t>How to test secure rest</a:t>
+            </a:r>
+          </a:p>
+          <a:p>
+            <a:pPr lvl="2"/>
+            <a:r>
+              <a:rPr lang="en-US" i="1" dirty="0" err="1">
+                <a:solidFill>
+                  <a:schemeClr val="accent1">
+                    <a:lumMod val="60000"/>
+                    <a:lumOff val="40000"/>
+                  </a:schemeClr>
+                </a:solidFill>
+              </a:rPr>
+              <a:t>MockMvcBuilders.apply</a:t>
+            </a:r>
+            <a:r>
+              <a:rPr lang="en-US" i="1" dirty="0">
+                <a:solidFill>
+                  <a:schemeClr val="accent1">
+                    <a:lumMod val="60000"/>
+                    <a:lumOff val="40000"/>
+                  </a:schemeClr>
+                </a:solidFill>
+              </a:rPr>
+              <a:t>( </a:t>
+            </a:r>
+            <a:r>
+              <a:rPr lang="en-US" i="1" dirty="0" err="1">
+                <a:solidFill>
+                  <a:schemeClr val="accent1">
+                    <a:lumMod val="60000"/>
+                    <a:lumOff val="40000"/>
+                  </a:schemeClr>
+                </a:solidFill>
+              </a:rPr>
+              <a:t>springSecurity</a:t>
+            </a:r>
+            <a:r>
+              <a:rPr lang="en-US" i="1" dirty="0">
+                <a:solidFill>
+                  <a:schemeClr val="accent1">
+                    <a:lumMod val="60000"/>
+                    <a:lumOff val="40000"/>
+                  </a:schemeClr>
+                </a:solidFill>
+              </a:rPr>
+              <a:t>() ) </a:t>
+            </a:r>
+            <a:r>
+              <a:rPr lang="en-US" dirty="0">
+                <a:solidFill>
+                  <a:schemeClr val="tx1"/>
+                </a:solidFill>
+              </a:rPr>
+              <a:t>– apply security in </a:t>
+            </a:r>
+            <a:r>
+              <a:rPr lang="en-US" dirty="0" err="1">
+                <a:solidFill>
+                  <a:schemeClr val="tx1"/>
+                </a:solidFill>
+              </a:rPr>
+              <a:t>mvc</a:t>
+            </a:r>
+            <a:r>
+              <a:rPr lang="en-US" dirty="0">
+                <a:solidFill>
+                  <a:schemeClr val="tx1"/>
+                </a:solidFill>
+              </a:rPr>
+              <a:t> mock.</a:t>
+            </a:r>
+          </a:p>
+          <a:p>
+            <a:pPr lvl="2"/>
+            <a:r>
+              <a:rPr lang="en-US" i="1" dirty="0">
+                <a:solidFill>
+                  <a:schemeClr val="accent1">
+                    <a:lumMod val="60000"/>
+                    <a:lumOff val="40000"/>
+                  </a:schemeClr>
+                </a:solidFill>
+              </a:rPr>
+              <a:t>@</a:t>
+            </a:r>
+            <a:r>
+              <a:rPr lang="en-US" i="1" dirty="0" err="1">
+                <a:solidFill>
+                  <a:schemeClr val="accent1">
+                    <a:lumMod val="60000"/>
+                    <a:lumOff val="40000"/>
+                  </a:schemeClr>
+                </a:solidFill>
+              </a:rPr>
+              <a:t>WithMockUser</a:t>
+            </a:r>
+            <a:r>
+              <a:rPr lang="en-US" i="1" dirty="0">
+                <a:solidFill>
+                  <a:schemeClr val="accent1">
+                    <a:lumMod val="60000"/>
+                    <a:lumOff val="40000"/>
+                  </a:schemeClr>
+                </a:solidFill>
+              </a:rPr>
+              <a:t>(username, role)</a:t>
+            </a:r>
+            <a:r>
+              <a:rPr lang="en-US" dirty="0">
+                <a:solidFill>
+                  <a:schemeClr val="accent1">
+                    <a:lumMod val="60000"/>
+                    <a:lumOff val="40000"/>
+                  </a:schemeClr>
+                </a:solidFill>
+              </a:rPr>
+              <a:t> </a:t>
+            </a:r>
+            <a:r>
+              <a:rPr lang="en-US" dirty="0">
+                <a:solidFill>
+                  <a:schemeClr val="tx1"/>
+                </a:solidFill>
+              </a:rPr>
+              <a:t>– run test as a mock user</a:t>
+            </a:r>
+            <a:endParaRPr lang="en-US" i="1" dirty="0">
+              <a:solidFill>
+                <a:schemeClr val="accent1">
+                  <a:lumMod val="60000"/>
+                  <a:lumOff val="40000"/>
+                </a:schemeClr>
+              </a:solidFill>
+            </a:endParaRPr>
+          </a:p>
+          <a:p>
+            <a:pPr lvl="2"/>
+            <a:r>
+              <a:rPr lang="en-US" i="1" dirty="0">
+                <a:solidFill>
+                  <a:schemeClr val="accent1">
+                    <a:lumMod val="60000"/>
+                    <a:lumOff val="40000"/>
+                  </a:schemeClr>
+                </a:solidFill>
+              </a:rPr>
+              <a:t>@</a:t>
+            </a:r>
+            <a:r>
+              <a:rPr lang="en-US" i="1" dirty="0" err="1">
+                <a:solidFill>
+                  <a:schemeClr val="accent1">
+                    <a:lumMod val="60000"/>
+                    <a:lumOff val="40000"/>
+                  </a:schemeClr>
+                </a:solidFill>
+              </a:rPr>
+              <a:t>WithAnonymousUser</a:t>
+            </a:r>
+            <a:r>
+              <a:rPr lang="en-US" i="1" dirty="0">
+                <a:solidFill>
+                  <a:schemeClr val="accent1">
+                    <a:lumMod val="60000"/>
+                    <a:lumOff val="40000"/>
+                  </a:schemeClr>
+                </a:solidFill>
+              </a:rPr>
+              <a:t> – </a:t>
+            </a:r>
+            <a:r>
+              <a:rPr lang="en-US" dirty="0">
+                <a:solidFill>
+                  <a:schemeClr val="tx1"/>
+                </a:solidFill>
+              </a:rPr>
+              <a:t>run test as an anonymous user</a:t>
+            </a:r>
+            <a:endParaRPr lang="en-US" i="1" dirty="0">
+              <a:solidFill>
+                <a:schemeClr val="tx1"/>
+              </a:solidFill>
+            </a:endParaRPr>
           </a:p>
         </p:txBody>
       </p:sp>
@@ -16031,7 +16290,7 @@
           <p:cNvPr id="2" name="Title 1">
             <a:extLst>
               <a:ext uri="{FF2B5EF4-FFF2-40B4-BE49-F238E27FC236}">
-                <a16:creationId xmlns:a16="http://schemas.microsoft.com/office/drawing/2014/main" id="{42AACF40-1801-4FE7-8352-C5D6505C283B}"/>
+                <a16:creationId xmlns:a16="http://schemas.microsoft.com/office/drawing/2014/main" id="{26E1E65E-FCEE-400F-A6C8-37BD77899590}"/>
               </a:ext>
             </a:extLst>
           </p:cNvPr>
@@ -16049,46 +16308,251 @@
           <a:p>
             <a:r>
               <a:rPr lang="en-US" dirty="0"/>
-              <a:t>Save vs Insert</a:t>
+              <a:t>Spring security for RESTful API</a:t>
             </a:r>
           </a:p>
         </p:txBody>
       </p:sp>
-      <p:graphicFrame>
-        <p:nvGraphicFramePr>
-          <p:cNvPr id="6" name="Content Placeholder 5">
+      <p:sp>
+        <p:nvSpPr>
+          <p:cNvPr id="3" name="Content Placeholder 2">
             <a:extLst>
               <a:ext uri="{FF2B5EF4-FFF2-40B4-BE49-F238E27FC236}">
-                <a16:creationId xmlns:a16="http://schemas.microsoft.com/office/drawing/2014/main" id="{5F9E1399-3B79-4E8E-BA87-D5AB0B294435}"/>
+                <a16:creationId xmlns:a16="http://schemas.microsoft.com/office/drawing/2014/main" id="{40A126E7-D6C8-42B1-8901-0BDFE8E62E9D}"/>
               </a:ext>
             </a:extLst>
           </p:cNvPr>
-          <p:cNvGraphicFramePr>
-            <a:graphicFrameLocks noGrp="1"/>
-          </p:cNvGraphicFramePr>
+          <p:cNvSpPr>
+            <a:spLocks noGrp="1"/>
+          </p:cNvSpPr>
           <p:nvPr>
             <p:ph idx="1"/>
-            <p:extLst>
-              <p:ext uri="{D42A27DB-BD31-4B8C-83A1-F6EECF244321}">
-                <p14:modId xmlns:p14="http://schemas.microsoft.com/office/powerpoint/2010/main" val="2563260664"/>
-              </p:ext>
-            </p:extLst>
           </p:nvPr>
-        </p:nvGraphicFramePr>
-        <p:xfrm>
-          <a:off x="677863" y="1249960"/>
-          <a:ext cx="9506372" cy="5377343"/>
-        </p:xfrm>
-        <a:graphic>
-          <a:graphicData uri="http://schemas.openxmlformats.org/drawingml/2006/chart">
-            <c:chart xmlns:c="http://schemas.openxmlformats.org/drawingml/2006/chart" xmlns:r="http://schemas.openxmlformats.org/officeDocument/2006/relationships" r:id="rId2"/>
-          </a:graphicData>
-        </a:graphic>
-      </p:graphicFrame>
+        </p:nvSpPr>
+        <p:spPr/>
+        <p:txBody>
+          <a:bodyPr/>
+          <a:lstStyle/>
+          <a:p>
+            <a:r>
+              <a:rPr lang="en-US" dirty="0"/>
+              <a:t>How to configure?</a:t>
+            </a:r>
+          </a:p>
+          <a:p>
+            <a:pPr lvl="1"/>
+            <a:r>
+              <a:rPr lang="en-US" dirty="0"/>
+              <a:t>Configuration class that extends </a:t>
+            </a:r>
+            <a:r>
+              <a:rPr lang="en-US" i="1" dirty="0" err="1">
+                <a:solidFill>
+                  <a:schemeClr val="accent1">
+                    <a:lumMod val="60000"/>
+                    <a:lumOff val="40000"/>
+                  </a:schemeClr>
+                </a:solidFill>
+              </a:rPr>
+              <a:t>WebSecurityConfigurerAdapter</a:t>
+            </a:r>
+            <a:endParaRPr lang="en-US" i="1" dirty="0">
+              <a:solidFill>
+                <a:schemeClr val="accent1">
+                  <a:lumMod val="60000"/>
+                  <a:lumOff val="40000"/>
+                </a:schemeClr>
+              </a:solidFill>
+            </a:endParaRPr>
+          </a:p>
+          <a:p>
+            <a:pPr lvl="2"/>
+            <a:r>
+              <a:rPr lang="en-US" dirty="0">
+                <a:solidFill>
+                  <a:schemeClr val="tx1"/>
+                </a:solidFill>
+              </a:rPr>
+              <a:t>Override method</a:t>
+            </a:r>
+            <a:r>
+              <a:rPr lang="en-US" i="1" dirty="0">
+                <a:solidFill>
+                  <a:schemeClr val="accent1">
+                    <a:lumMod val="60000"/>
+                    <a:lumOff val="40000"/>
+                  </a:schemeClr>
+                </a:solidFill>
+              </a:rPr>
+              <a:t> configure( </a:t>
+            </a:r>
+            <a:r>
+              <a:rPr lang="en-US" i="1" dirty="0" err="1">
+                <a:solidFill>
+                  <a:schemeClr val="accent1">
+                    <a:lumMod val="60000"/>
+                    <a:lumOff val="40000"/>
+                  </a:schemeClr>
+                </a:solidFill>
+              </a:rPr>
+              <a:t>HttpSecurity</a:t>
+            </a:r>
+            <a:r>
+              <a:rPr lang="en-US" i="1" dirty="0">
+                <a:solidFill>
+                  <a:schemeClr val="accent1">
+                    <a:lumMod val="60000"/>
+                    <a:lumOff val="40000"/>
+                  </a:schemeClr>
+                </a:solidFill>
+              </a:rPr>
+              <a:t> http )</a:t>
+            </a:r>
+          </a:p>
+          <a:p>
+            <a:pPr lvl="3"/>
+            <a:r>
+              <a:rPr lang="de-DE" dirty="0">
+                <a:solidFill>
+                  <a:schemeClr val="tx1"/>
+                </a:solidFill>
+              </a:rPr>
+              <a:t>Protect wanted api, by url maching or http status</a:t>
+            </a:r>
+            <a:endParaRPr lang="en-US" dirty="0">
+              <a:solidFill>
+                <a:schemeClr val="tx1"/>
+              </a:solidFill>
+            </a:endParaRPr>
+          </a:p>
+          <a:p>
+            <a:pPr lvl="1"/>
+            <a:r>
+              <a:rPr lang="de-DE" dirty="0">
+                <a:solidFill>
+                  <a:schemeClr val="tx1"/>
+                </a:solidFill>
+              </a:rPr>
+              <a:t>Configuration by</a:t>
+            </a:r>
+            <a:r>
+              <a:rPr lang="en-US" dirty="0">
+                <a:solidFill>
+                  <a:schemeClr val="tx1"/>
+                </a:solidFill>
+              </a:rPr>
+              <a:t> annotation	</a:t>
+            </a:r>
+          </a:p>
+          <a:p>
+            <a:pPr lvl="2"/>
+            <a:r>
+              <a:rPr lang="en-US" i="1" dirty="0">
+                <a:solidFill>
+                  <a:schemeClr val="accent1">
+                    <a:lumMod val="60000"/>
+                    <a:lumOff val="40000"/>
+                  </a:schemeClr>
+                </a:solidFill>
+              </a:rPr>
+              <a:t>@</a:t>
+            </a:r>
+            <a:r>
+              <a:rPr lang="en-US" i="1" dirty="0" err="1">
+                <a:solidFill>
+                  <a:schemeClr val="accent1">
+                    <a:lumMod val="60000"/>
+                    <a:lumOff val="40000"/>
+                  </a:schemeClr>
+                </a:solidFill>
+              </a:rPr>
+              <a:t>EnableGlobalMethodSecurity</a:t>
+            </a:r>
+            <a:r>
+              <a:rPr lang="en-US" dirty="0"/>
+              <a:t> – on an configuration class</a:t>
+            </a:r>
+          </a:p>
+          <a:p>
+            <a:pPr lvl="2"/>
+            <a:r>
+              <a:rPr lang="en-US" i="1" dirty="0">
+                <a:solidFill>
+                  <a:schemeClr val="accent1">
+                    <a:lumMod val="60000"/>
+                    <a:lumOff val="40000"/>
+                  </a:schemeClr>
+                </a:solidFill>
+              </a:rPr>
+              <a:t>@Secure, @</a:t>
+            </a:r>
+            <a:r>
+              <a:rPr lang="en-US" i="1" dirty="0" err="1">
+                <a:solidFill>
+                  <a:schemeClr val="accent1">
+                    <a:lumMod val="60000"/>
+                    <a:lumOff val="40000"/>
+                  </a:schemeClr>
+                </a:solidFill>
+              </a:rPr>
+              <a:t>PreAuthorization</a:t>
+            </a:r>
+            <a:r>
+              <a:rPr lang="en-US" i="1" dirty="0">
+                <a:solidFill>
+                  <a:schemeClr val="accent1">
+                    <a:lumMod val="60000"/>
+                    <a:lumOff val="40000"/>
+                  </a:schemeClr>
+                </a:solidFill>
+              </a:rPr>
+              <a:t>, @</a:t>
+            </a:r>
+            <a:r>
+              <a:rPr lang="en-US" i="1" dirty="0" err="1">
+                <a:solidFill>
+                  <a:schemeClr val="accent1">
+                    <a:lumMod val="60000"/>
+                    <a:lumOff val="40000"/>
+                  </a:schemeClr>
+                </a:solidFill>
+              </a:rPr>
+              <a:t>PostFilter</a:t>
+            </a:r>
+            <a:r>
+              <a:rPr lang="en-US" i="1" dirty="0">
+                <a:solidFill>
+                  <a:schemeClr val="accent1">
+                    <a:lumMod val="60000"/>
+                    <a:lumOff val="40000"/>
+                  </a:schemeClr>
+                </a:solidFill>
+              </a:rPr>
+              <a:t> - </a:t>
+            </a:r>
+            <a:r>
+              <a:rPr lang="en-US" i="1" dirty="0">
+                <a:solidFill>
+                  <a:schemeClr val="tx1"/>
+                </a:solidFill>
+              </a:rPr>
+              <a:t>on Controller or Service class </a:t>
+            </a:r>
+            <a:endParaRPr lang="en-US" dirty="0"/>
+          </a:p>
+          <a:p>
+            <a:pPr lvl="1"/>
+            <a:r>
+              <a:rPr lang="en-US" dirty="0"/>
+              <a:t>These two approaches can be combined</a:t>
+            </a:r>
+          </a:p>
+        </p:txBody>
+      </p:sp>
     </p:spTree>
     <p:extLst>
       <p:ext uri="{BB962C8B-B14F-4D97-AF65-F5344CB8AC3E}">
-        <p14:creationId xmlns:p14="http://schemas.microsoft.com/office/powerpoint/2010/main" val="835022568"/>
+        <p14:creationId xmlns:p14="http://schemas.microsoft.com/office/powerpoint/2010/main" val="1660350519"/>
       </p:ext>
     </p:extLst>
   </p:cSld>
@@ -16117,120 +16581,301 @@
       </p:grpSpPr>
       <p:sp>
         <p:nvSpPr>
-          <p:cNvPr id="9" name="Rectangle 8">
+          <p:cNvPr id="2" name="Title 1">
             <a:extLst>
               <a:ext uri="{FF2B5EF4-FFF2-40B4-BE49-F238E27FC236}">
-                <a16:creationId xmlns:a16="http://schemas.microsoft.com/office/drawing/2014/main" id="{C303B3C0-7F6F-4296-9A43-3BFA5E11B15E}"/>
+                <a16:creationId xmlns:a16="http://schemas.microsoft.com/office/drawing/2014/main" id="{ECC92670-B704-4D03-BF47-1DD318E164A5}"/>
               </a:ext>
             </a:extLst>
           </p:cNvPr>
-          <p:cNvSpPr/>
-          <p:nvPr/>
+          <p:cNvSpPr>
+            <a:spLocks noGrp="1"/>
+          </p:cNvSpPr>
+          <p:nvPr>
+            <p:ph type="title"/>
+          </p:nvPr>
         </p:nvSpPr>
-        <p:spPr>
-          <a:xfrm>
-            <a:off x="1577131" y="2818701"/>
-            <a:ext cx="8078598" cy="1754326"/>
-          </a:xfrm>
-          <a:prstGeom prst="rect">
-            <a:avLst/>
-          </a:prstGeom>
-        </p:spPr>
+        <p:spPr/>
         <p:txBody>
-          <a:bodyPr wrap="square">
-            <a:spAutoFit/>
-          </a:bodyPr>
+          <a:bodyPr/>
           <a:lstStyle/>
           <a:p>
             <a:r>
               <a:rPr lang="en-US" dirty="0"/>
-              <a:t>{ </a:t>
+              <a:t>Spring security for RESTful API</a:t>
+            </a:r>
+          </a:p>
+        </p:txBody>
+      </p:sp>
+      <p:sp>
+        <p:nvSpPr>
+          <p:cNvPr id="3" name="Content Placeholder 2">
+            <a:extLst>
+              <a:ext uri="{FF2B5EF4-FFF2-40B4-BE49-F238E27FC236}">
+                <a16:creationId xmlns:a16="http://schemas.microsoft.com/office/drawing/2014/main" id="{0A273255-D74E-4936-9387-7FFF1D5080C1}"/>
+              </a:ext>
+            </a:extLst>
+          </p:cNvPr>
+          <p:cNvSpPr>
+            <a:spLocks noGrp="1"/>
+          </p:cNvSpPr>
+          <p:nvPr>
+            <p:ph idx="1"/>
+          </p:nvPr>
+        </p:nvSpPr>
+        <p:spPr/>
+        <p:txBody>
+          <a:bodyPr/>
+          <a:lstStyle/>
+          <a:p>
+            <a:r>
+              <a:rPr lang="en-US" dirty="0"/>
+              <a:t>Authentication provide</a:t>
+            </a:r>
+          </a:p>
+          <a:p>
+            <a:pPr lvl="1"/>
+            <a:r>
+              <a:rPr lang="en-US" dirty="0"/>
+              <a:t>Setup by overriding method  </a:t>
+            </a:r>
+            <a:r>
+              <a:rPr lang="en-US" i="1" dirty="0">
+                <a:solidFill>
+                  <a:schemeClr val="accent1">
+                    <a:lumMod val="60000"/>
+                    <a:lumOff val="40000"/>
+                  </a:schemeClr>
+                </a:solidFill>
+              </a:rPr>
+              <a:t>configure( </a:t>
+            </a:r>
+            <a:r>
+              <a:rPr lang="en-US" i="1" dirty="0" err="1">
+                <a:solidFill>
+                  <a:schemeClr val="accent1">
+                    <a:lumMod val="60000"/>
+                    <a:lumOff val="40000"/>
+                  </a:schemeClr>
+                </a:solidFill>
+              </a:rPr>
+              <a:t>AuthenticationManagerBuilder</a:t>
+            </a:r>
+            <a:r>
+              <a:rPr lang="en-US" i="1" dirty="0">
+                <a:solidFill>
+                  <a:schemeClr val="accent1">
+                    <a:lumMod val="60000"/>
+                    <a:lumOff val="40000"/>
+                  </a:schemeClr>
+                </a:solidFill>
+              </a:rPr>
+              <a:t> )	</a:t>
+            </a:r>
+          </a:p>
+          <a:p>
+            <a:pPr lvl="1"/>
+            <a:r>
+              <a:rPr lang="de-DE" i="1" dirty="0">
+                <a:solidFill>
+                  <a:schemeClr val="tx1"/>
+                </a:solidFill>
+              </a:rPr>
+              <a:t>Spring offer a few providers</a:t>
+            </a:r>
+            <a:r>
+              <a:rPr lang="en-US" i="1" dirty="0">
+                <a:solidFill>
+                  <a:schemeClr val="tx1"/>
+                </a:solidFill>
+              </a:rPr>
+              <a:t>:</a:t>
+            </a:r>
+          </a:p>
+          <a:p>
+            <a:pPr lvl="2"/>
+            <a:r>
+              <a:rPr lang="en-US" i="1" dirty="0" err="1">
+                <a:solidFill>
+                  <a:schemeClr val="accent1">
+                    <a:lumMod val="60000"/>
+                    <a:lumOff val="40000"/>
+                  </a:schemeClr>
+                </a:solidFill>
+              </a:rPr>
+              <a:t>AuthenticationManagerBuilder#inMemoryAuthentication</a:t>
+            </a:r>
+            <a:r>
+              <a:rPr lang="en-US" i="1" dirty="0">
+                <a:solidFill>
+                  <a:schemeClr val="accent1">
+                    <a:lumMod val="60000"/>
+                    <a:lumOff val="40000"/>
+                  </a:schemeClr>
+                </a:solidFill>
+              </a:rPr>
+              <a:t>()</a:t>
+            </a:r>
+          </a:p>
+          <a:p>
+            <a:pPr lvl="2"/>
+            <a:r>
+              <a:rPr lang="en-US" i="1" dirty="0" err="1">
+                <a:solidFill>
+                  <a:schemeClr val="accent1">
+                    <a:lumMod val="60000"/>
+                    <a:lumOff val="40000"/>
+                  </a:schemeClr>
+                </a:solidFill>
+              </a:rPr>
+              <a:t>AuthenticationManagerBuilder#ldapAuthentication</a:t>
+            </a:r>
+            <a:r>
+              <a:rPr lang="en-US" i="1" dirty="0">
+                <a:solidFill>
+                  <a:schemeClr val="accent1">
+                    <a:lumMod val="60000"/>
+                    <a:lumOff val="40000"/>
+                  </a:schemeClr>
+                </a:solidFill>
+              </a:rPr>
+              <a:t>()</a:t>
+            </a:r>
+          </a:p>
+          <a:p>
+            <a:pPr lvl="2"/>
+            <a:r>
+              <a:rPr lang="en-US" i="1" dirty="0" err="1">
+                <a:solidFill>
+                  <a:schemeClr val="accent1">
+                    <a:lumMod val="60000"/>
+                    <a:lumOff val="40000"/>
+                  </a:schemeClr>
+                </a:solidFill>
+              </a:rPr>
+              <a:t>AuthenticationManagerBuilder#jdbcAuthentication</a:t>
+            </a:r>
+            <a:r>
+              <a:rPr lang="en-US" i="1" dirty="0">
+                <a:solidFill>
+                  <a:schemeClr val="accent1">
+                    <a:lumMod val="60000"/>
+                    <a:lumOff val="40000"/>
+                  </a:schemeClr>
+                </a:solidFill>
+              </a:rPr>
+              <a:t>()</a:t>
+            </a:r>
+          </a:p>
+          <a:p>
+            <a:pPr lvl="1"/>
+            <a:r>
+              <a:rPr lang="en-US" dirty="0"/>
+              <a:t>Create authentication provider by </a:t>
             </a:r>
             <a:r>
               <a:rPr lang="en-US" dirty="0" err="1"/>
-              <a:t>firstName</a:t>
-            </a:r>
-            <a:r>
-              <a:rPr lang="en-US" dirty="0"/>
-              <a:t> : "Max",</a:t>
-            </a:r>
-          </a:p>
-          <a:p>
-            <a:r>
-              <a:rPr lang="en-US" dirty="0"/>
-              <a:t>  </a:t>
+              <a:t>yourselve</a:t>
+            </a:r>
+            <a:endParaRPr lang="en-US" dirty="0"/>
+          </a:p>
+          <a:p>
+            <a:pPr lvl="2"/>
+            <a:r>
+              <a:rPr lang="en-US" dirty="0"/>
+              <a:t>Why, when? Support different kind of authentication ( file/</a:t>
             </a:r>
             <a:r>
               <a:rPr lang="en-US" dirty="0" err="1"/>
-              <a:t>lastName</a:t>
-            </a:r>
-            <a:r>
-              <a:rPr lang="en-US" dirty="0"/>
-              <a:t> : "</a:t>
-            </a:r>
-            <a:r>
-              <a:rPr lang="en-US" dirty="0" err="1"/>
-              <a:t>Mustermann</a:t>
-            </a:r>
-            <a:r>
-              <a:rPr lang="en-US" dirty="0"/>
-              <a:t>",</a:t>
-            </a:r>
-          </a:p>
-          <a:p>
-            <a:r>
-              <a:rPr lang="en-US" dirty="0"/>
-              <a:t>  links : [ { </a:t>
-            </a:r>
-            <a:r>
-              <a:rPr lang="en-US" dirty="0" err="1"/>
-              <a:t>rel</a:t>
-            </a:r>
-            <a:r>
-              <a:rPr lang="en-US" dirty="0"/>
-              <a:t> : "self", </a:t>
-            </a:r>
-            <a:r>
-              <a:rPr lang="en-US" dirty="0" err="1"/>
-              <a:t>href</a:t>
-            </a:r>
-            <a:r>
-              <a:rPr lang="en-US" dirty="0"/>
-              <a:t> : "http://localhost/users/13" },</a:t>
-            </a:r>
-          </a:p>
-          <a:p>
-            <a:r>
-              <a:rPr lang="en-US" dirty="0"/>
-              <a:t>		 { </a:t>
-            </a:r>
-            <a:r>
-              <a:rPr lang="en-US" dirty="0" err="1"/>
-              <a:t>rel</a:t>
-            </a:r>
-            <a:r>
-              <a:rPr lang="en-US" dirty="0"/>
-              <a:t> : "contacts", </a:t>
-            </a:r>
-            <a:r>
-              <a:rPr lang="en-US" dirty="0" err="1"/>
-              <a:t>href</a:t>
-            </a:r>
-            <a:r>
-              <a:rPr lang="en-US" dirty="0"/>
-              <a:t> : "http://localhost/users/13/contacts" }</a:t>
-            </a:r>
-          </a:p>
-          <a:p>
-            <a:r>
-              <a:rPr lang="en-US" dirty="0"/>
-              <a:t>	] </a:t>
-            </a:r>
-          </a:p>
-          <a:p>
-            <a:r>
-              <a:rPr lang="en-US" dirty="0"/>
-              <a:t>}</a:t>
+              <a:t>db</a:t>
+            </a:r>
+            <a:r>
+              <a:rPr lang="en-US" dirty="0"/>
+              <a:t> + JWT )</a:t>
+            </a:r>
+          </a:p>
+          <a:p>
+            <a:pPr lvl="2"/>
+            <a:r>
+              <a:rPr lang="en-US" dirty="0"/>
+              <a:t>How? Implements interface </a:t>
+            </a:r>
+            <a:r>
+              <a:rPr lang="en-US" i="1" dirty="0" err="1">
+                <a:solidFill>
+                  <a:schemeClr val="accent1">
+                    <a:lumMod val="60000"/>
+                    <a:lumOff val="40000"/>
+                  </a:schemeClr>
+                </a:solidFill>
+              </a:rPr>
+              <a:t>AuthenticationProvider</a:t>
+            </a:r>
+            <a:r>
+              <a:rPr lang="en-US" dirty="0"/>
+              <a:t> and register service bean</a:t>
+            </a:r>
+          </a:p>
+          <a:p>
+            <a:pPr lvl="3"/>
+            <a:r>
+              <a:rPr lang="en-US" dirty="0"/>
+              <a:t>Assign bean </a:t>
+            </a:r>
+            <a:r>
+              <a:rPr lang="en-US" i="1" dirty="0" err="1">
+                <a:solidFill>
+                  <a:schemeClr val="accent1">
+                    <a:lumMod val="60000"/>
+                    <a:lumOff val="40000"/>
+                  </a:schemeClr>
+                </a:solidFill>
+              </a:rPr>
+              <a:t>AuthenticationManagerBuilder</a:t>
+            </a:r>
+            <a:r>
+              <a:rPr lang="en-US" dirty="0" err="1">
+                <a:solidFill>
+                  <a:schemeClr val="accent1">
+                    <a:lumMod val="60000"/>
+                    <a:lumOff val="40000"/>
+                  </a:schemeClr>
+                </a:solidFill>
+              </a:rPr>
+              <a:t>.authenticationProvider</a:t>
+            </a:r>
+            <a:r>
+              <a:rPr lang="en-US" dirty="0">
+                <a:solidFill>
+                  <a:schemeClr val="accent1">
+                    <a:lumMod val="60000"/>
+                    <a:lumOff val="40000"/>
+                  </a:schemeClr>
+                </a:solidFill>
+              </a:rPr>
+              <a:t>( </a:t>
+            </a:r>
+            <a:r>
+              <a:rPr lang="en-US" dirty="0" err="1">
+                <a:solidFill>
+                  <a:schemeClr val="accent1">
+                    <a:lumMod val="60000"/>
+                    <a:lumOff val="40000"/>
+                  </a:schemeClr>
+                </a:solidFill>
+              </a:rPr>
+              <a:t>authenticationProvider</a:t>
+            </a:r>
+            <a:r>
+              <a:rPr lang="en-US" dirty="0">
+                <a:solidFill>
+                  <a:schemeClr val="accent1">
+                    <a:lumMod val="60000"/>
+                    <a:lumOff val="40000"/>
+                  </a:schemeClr>
+                </a:solidFill>
+              </a:rPr>
+              <a:t> )</a:t>
             </a:r>
           </a:p>
         </p:txBody>
@@ -16238,7 +16883,7 @@
     </p:spTree>
     <p:extLst>
       <p:ext uri="{BB962C8B-B14F-4D97-AF65-F5344CB8AC3E}">
-        <p14:creationId xmlns:p14="http://schemas.microsoft.com/office/powerpoint/2010/main" val="1587813567"/>
+        <p14:creationId xmlns:p14="http://schemas.microsoft.com/office/powerpoint/2010/main" val="297851544"/>
       </p:ext>
     </p:extLst>
   </p:cSld>
@@ -16415,6 +17060,245 @@
     <p:extLst>
       <p:ext uri="{BB962C8B-B14F-4D97-AF65-F5344CB8AC3E}">
         <p14:creationId xmlns:p14="http://schemas.microsoft.com/office/powerpoint/2010/main" val="1016943852"/>
+      </p:ext>
+    </p:extLst>
+  </p:cSld>
+  <p:clrMapOvr>
+    <a:masterClrMapping/>
+  </p:clrMapOvr>
+</p:sld>
+</file>
+
+<file path=ppt/slides/slide30.xml><?xml version="1.0" encoding="utf-8"?>
+<p:sld xmlns:a="http://schemas.openxmlformats.org/drawingml/2006/main" xmlns:r="http://schemas.openxmlformats.org/officeDocument/2006/relationships" xmlns:p="http://schemas.openxmlformats.org/presentationml/2006/main">
+  <p:cSld>
+    <p:spTree>
+      <p:nvGrpSpPr>
+        <p:cNvPr id="1" name=""/>
+        <p:cNvGrpSpPr/>
+        <p:nvPr/>
+      </p:nvGrpSpPr>
+      <p:grpSpPr>
+        <a:xfrm>
+          <a:off x="0" y="0"/>
+          <a:ext cx="0" cy="0"/>
+          <a:chOff x="0" y="0"/>
+          <a:chExt cx="0" cy="0"/>
+        </a:xfrm>
+      </p:grpSpPr>
+      <p:sp>
+        <p:nvSpPr>
+          <p:cNvPr id="2" name="Title 1">
+            <a:extLst>
+              <a:ext uri="{FF2B5EF4-FFF2-40B4-BE49-F238E27FC236}">
+                <a16:creationId xmlns:a16="http://schemas.microsoft.com/office/drawing/2014/main" id="{42AACF40-1801-4FE7-8352-C5D6505C283B}"/>
+              </a:ext>
+            </a:extLst>
+          </p:cNvPr>
+          <p:cNvSpPr>
+            <a:spLocks noGrp="1"/>
+          </p:cNvSpPr>
+          <p:nvPr>
+            <p:ph type="title"/>
+          </p:nvPr>
+        </p:nvSpPr>
+        <p:spPr/>
+        <p:txBody>
+          <a:bodyPr/>
+          <a:lstStyle/>
+          <a:p>
+            <a:r>
+              <a:rPr lang="en-US" dirty="0"/>
+              <a:t>Save vs Insert</a:t>
+            </a:r>
+          </a:p>
+        </p:txBody>
+      </p:sp>
+      <p:graphicFrame>
+        <p:nvGraphicFramePr>
+          <p:cNvPr id="6" name="Content Placeholder 5">
+            <a:extLst>
+              <a:ext uri="{FF2B5EF4-FFF2-40B4-BE49-F238E27FC236}">
+                <a16:creationId xmlns:a16="http://schemas.microsoft.com/office/drawing/2014/main" id="{5F9E1399-3B79-4E8E-BA87-D5AB0B294435}"/>
+              </a:ext>
+            </a:extLst>
+          </p:cNvPr>
+          <p:cNvGraphicFramePr>
+            <a:graphicFrameLocks noGrp="1"/>
+          </p:cNvGraphicFramePr>
+          <p:nvPr>
+            <p:ph idx="1"/>
+            <p:extLst>
+              <p:ext uri="{D42A27DB-BD31-4B8C-83A1-F6EECF244321}">
+                <p14:modId xmlns:p14="http://schemas.microsoft.com/office/powerpoint/2010/main" val="2563260664"/>
+              </p:ext>
+            </p:extLst>
+          </p:nvPr>
+        </p:nvGraphicFramePr>
+        <p:xfrm>
+          <a:off x="677863" y="1249960"/>
+          <a:ext cx="9506372" cy="5377343"/>
+        </p:xfrm>
+        <a:graphic>
+          <a:graphicData uri="http://schemas.openxmlformats.org/drawingml/2006/chart">
+            <c:chart xmlns:c="http://schemas.openxmlformats.org/drawingml/2006/chart" xmlns:r="http://schemas.openxmlformats.org/officeDocument/2006/relationships" r:id="rId2"/>
+          </a:graphicData>
+        </a:graphic>
+      </p:graphicFrame>
+    </p:spTree>
+    <p:extLst>
+      <p:ext uri="{BB962C8B-B14F-4D97-AF65-F5344CB8AC3E}">
+        <p14:creationId xmlns:p14="http://schemas.microsoft.com/office/powerpoint/2010/main" val="835022568"/>
+      </p:ext>
+    </p:extLst>
+  </p:cSld>
+  <p:clrMapOvr>
+    <a:masterClrMapping/>
+  </p:clrMapOvr>
+</p:sld>
+</file>
+
+<file path=ppt/slides/slide31.xml><?xml version="1.0" encoding="utf-8"?>
+<p:sld xmlns:a="http://schemas.openxmlformats.org/drawingml/2006/main" xmlns:r="http://schemas.openxmlformats.org/officeDocument/2006/relationships" xmlns:p="http://schemas.openxmlformats.org/presentationml/2006/main">
+  <p:cSld>
+    <p:spTree>
+      <p:nvGrpSpPr>
+        <p:cNvPr id="1" name=""/>
+        <p:cNvGrpSpPr/>
+        <p:nvPr/>
+      </p:nvGrpSpPr>
+      <p:grpSpPr>
+        <a:xfrm>
+          <a:off x="0" y="0"/>
+          <a:ext cx="0" cy="0"/>
+          <a:chOff x="0" y="0"/>
+          <a:chExt cx="0" cy="0"/>
+        </a:xfrm>
+      </p:grpSpPr>
+      <p:sp>
+        <p:nvSpPr>
+          <p:cNvPr id="9" name="Rectangle 8">
+            <a:extLst>
+              <a:ext uri="{FF2B5EF4-FFF2-40B4-BE49-F238E27FC236}">
+                <a16:creationId xmlns:a16="http://schemas.microsoft.com/office/drawing/2014/main" id="{C303B3C0-7F6F-4296-9A43-3BFA5E11B15E}"/>
+              </a:ext>
+            </a:extLst>
+          </p:cNvPr>
+          <p:cNvSpPr/>
+          <p:nvPr/>
+        </p:nvSpPr>
+        <p:spPr>
+          <a:xfrm>
+            <a:off x="1577131" y="2818701"/>
+            <a:ext cx="8078598" cy="1754326"/>
+          </a:xfrm>
+          <a:prstGeom prst="rect">
+            <a:avLst/>
+          </a:prstGeom>
+        </p:spPr>
+        <p:txBody>
+          <a:bodyPr wrap="square">
+            <a:spAutoFit/>
+          </a:bodyPr>
+          <a:lstStyle/>
+          <a:p>
+            <a:r>
+              <a:rPr lang="en-US" dirty="0"/>
+              <a:t>{ </a:t>
+            </a:r>
+            <a:r>
+              <a:rPr lang="en-US" dirty="0" err="1"/>
+              <a:t>firstName</a:t>
+            </a:r>
+            <a:r>
+              <a:rPr lang="en-US" dirty="0"/>
+              <a:t> : "Max",</a:t>
+            </a:r>
+          </a:p>
+          <a:p>
+            <a:r>
+              <a:rPr lang="en-US" dirty="0"/>
+              <a:t>  </a:t>
+            </a:r>
+            <a:r>
+              <a:rPr lang="en-US" dirty="0" err="1"/>
+              <a:t>lastName</a:t>
+            </a:r>
+            <a:r>
+              <a:rPr lang="en-US" dirty="0"/>
+              <a:t> : "</a:t>
+            </a:r>
+            <a:r>
+              <a:rPr lang="en-US" dirty="0" err="1"/>
+              <a:t>Mustermann</a:t>
+            </a:r>
+            <a:r>
+              <a:rPr lang="en-US" dirty="0"/>
+              <a:t>",</a:t>
+            </a:r>
+          </a:p>
+          <a:p>
+            <a:r>
+              <a:rPr lang="en-US" dirty="0"/>
+              <a:t>  links : [ { </a:t>
+            </a:r>
+            <a:r>
+              <a:rPr lang="en-US" dirty="0" err="1"/>
+              <a:t>rel</a:t>
+            </a:r>
+            <a:r>
+              <a:rPr lang="en-US" dirty="0"/>
+              <a:t> : "self", </a:t>
+            </a:r>
+            <a:r>
+              <a:rPr lang="en-US" dirty="0" err="1"/>
+              <a:t>href</a:t>
+            </a:r>
+            <a:r>
+              <a:rPr lang="en-US" dirty="0"/>
+              <a:t> : "http://localhost/users/13" },</a:t>
+            </a:r>
+          </a:p>
+          <a:p>
+            <a:r>
+              <a:rPr lang="en-US" dirty="0"/>
+              <a:t>		 { </a:t>
+            </a:r>
+            <a:r>
+              <a:rPr lang="en-US" dirty="0" err="1"/>
+              <a:t>rel</a:t>
+            </a:r>
+            <a:r>
+              <a:rPr lang="en-US" dirty="0"/>
+              <a:t> : "contacts", </a:t>
+            </a:r>
+            <a:r>
+              <a:rPr lang="en-US" dirty="0" err="1"/>
+              <a:t>href</a:t>
+            </a:r>
+            <a:r>
+              <a:rPr lang="en-US" dirty="0"/>
+              <a:t> : "http://localhost/users/13/contacts" }</a:t>
+            </a:r>
+          </a:p>
+          <a:p>
+            <a:r>
+              <a:rPr lang="en-US" dirty="0"/>
+              <a:t>	] </a:t>
+            </a:r>
+          </a:p>
+          <a:p>
+            <a:r>
+              <a:rPr lang="en-US" dirty="0"/>
+              <a:t>}</a:t>
+            </a:r>
+          </a:p>
+        </p:txBody>
+      </p:sp>
+    </p:spTree>
+    <p:extLst>
+      <p:ext uri="{BB962C8B-B14F-4D97-AF65-F5344CB8AC3E}">
+        <p14:creationId xmlns:p14="http://schemas.microsoft.com/office/powerpoint/2010/main" val="1587813567"/>
       </p:ext>
     </p:extLst>
   </p:cSld>

</xml_diff>

<commit_message>
Spring cache example with test
</commit_message>
<xml_diff>
--- a/documentation/SpringBoot.pptx
+++ b/documentation/SpringBoot.pptx
@@ -34,8 +34,9 @@
     <p:sldId id="287" r:id="rId28"/>
     <p:sldId id="288" r:id="rId29"/>
     <p:sldId id="289" r:id="rId30"/>
-    <p:sldId id="274" r:id="rId31"/>
-    <p:sldId id="285" r:id="rId32"/>
+    <p:sldId id="290" r:id="rId31"/>
+    <p:sldId id="274" r:id="rId32"/>
+    <p:sldId id="285" r:id="rId33"/>
   </p:sldIdLst>
   <p:sldSz cx="12192000" cy="6858000"/>
   <p:notesSz cx="6858000" cy="9144000"/>
@@ -168,6 +169,7 @@
             <p14:sldId id="287"/>
             <p14:sldId id="288"/>
             <p14:sldId id="289"/>
+            <p14:sldId id="290"/>
           </p14:sldIdLst>
         </p14:section>
         <p14:section name="Popups" id="{0E31B68C-B07E-4497-B09D-B16B0C92DA63}">
@@ -5584,7 +5586,7 @@
             <a:fld id="{B61BEF0D-F0BB-DE4B-95CE-6DB70DBA9567}" type="datetimeFigureOut">
               <a:rPr lang="en-US" dirty="0"/>
               <a:pPr/>
-              <a:t>13.01.2018</a:t>
+              <a:t>14.01.2018</a:t>
             </a:fld>
             <a:endParaRPr lang="en-US" dirty="0"/>
           </a:p>
@@ -5832,7 +5834,7 @@
             <a:fld id="{B61BEF0D-F0BB-DE4B-95CE-6DB70DBA9567}" type="datetimeFigureOut">
               <a:rPr lang="en-US" dirty="0"/>
               <a:pPr/>
-              <a:t>13.01.2018</a:t>
+              <a:t>14.01.2018</a:t>
             </a:fld>
             <a:endParaRPr lang="en-US" dirty="0"/>
           </a:p>
@@ -6143,7 +6145,7 @@
             <a:fld id="{B61BEF0D-F0BB-DE4B-95CE-6DB70DBA9567}" type="datetimeFigureOut">
               <a:rPr lang="en-US" dirty="0"/>
               <a:pPr/>
-              <a:t>13.01.2018</a:t>
+              <a:t>14.01.2018</a:t>
             </a:fld>
             <a:endParaRPr lang="en-US" dirty="0"/>
           </a:p>
@@ -6467,7 +6469,7 @@
             <a:fld id="{B61BEF0D-F0BB-DE4B-95CE-6DB70DBA9567}" type="datetimeFigureOut">
               <a:rPr lang="en-US" dirty="0"/>
               <a:pPr/>
-              <a:t>13.01.2018</a:t>
+              <a:t>14.01.2018</a:t>
             </a:fld>
             <a:endParaRPr lang="en-US" dirty="0"/>
           </a:p>
@@ -6778,7 +6780,7 @@
             <a:fld id="{B61BEF0D-F0BB-DE4B-95CE-6DB70DBA9567}" type="datetimeFigureOut">
               <a:rPr lang="en-US" dirty="0"/>
               <a:pPr/>
-              <a:t>13.01.2018</a:t>
+              <a:t>14.01.2018</a:t>
             </a:fld>
             <a:endParaRPr lang="en-US" dirty="0"/>
           </a:p>
@@ -7162,7 +7164,7 @@
             <a:fld id="{B61BEF0D-F0BB-DE4B-95CE-6DB70DBA9567}" type="datetimeFigureOut">
               <a:rPr lang="en-US" dirty="0"/>
               <a:pPr/>
-              <a:t>13.01.2018</a:t>
+              <a:t>14.01.2018</a:t>
             </a:fld>
             <a:endParaRPr lang="en-US" dirty="0"/>
           </a:p>
@@ -7328,7 +7330,7 @@
           <a:p>
             <a:fld id="{55C6B4A9-1611-4792-9094-5F34BCA07E0B}" type="datetimeFigureOut">
               <a:rPr lang="en-US" dirty="0"/>
-              <a:t>13.01.2018</a:t>
+              <a:t>14.01.2018</a:t>
             </a:fld>
             <a:endParaRPr lang="en-US" dirty="0"/>
           </a:p>
@@ -7504,7 +7506,7 @@
             <a:fld id="{B61BEF0D-F0BB-DE4B-95CE-6DB70DBA9567}" type="datetimeFigureOut">
               <a:rPr lang="en-US" dirty="0"/>
               <a:pPr/>
-              <a:t>13.01.2018</a:t>
+              <a:t>14.01.2018</a:t>
             </a:fld>
             <a:endParaRPr lang="en-US" dirty="0"/>
           </a:p>
@@ -7677,7 +7679,7 @@
             <a:fld id="{B61BEF0D-F0BB-DE4B-95CE-6DB70DBA9567}" type="datetimeFigureOut">
               <a:rPr lang="en-US" dirty="0"/>
               <a:pPr/>
-              <a:t>13.01.2018</a:t>
+              <a:t>14.01.2018</a:t>
             </a:fld>
             <a:endParaRPr lang="en-US" dirty="0"/>
           </a:p>
@@ -7921,7 +7923,7 @@
             <a:fld id="{B61BEF0D-F0BB-DE4B-95CE-6DB70DBA9567}" type="datetimeFigureOut">
               <a:rPr lang="en-US" dirty="0"/>
               <a:pPr/>
-              <a:t>13.01.2018</a:t>
+              <a:t>14.01.2018</a:t>
             </a:fld>
             <a:endParaRPr lang="en-US" dirty="0"/>
           </a:p>
@@ -8149,7 +8151,7 @@
           <a:p>
             <a:fld id="{EB712588-04B1-427B-82EE-E8DB90309F08}" type="datetimeFigureOut">
               <a:rPr lang="en-US" dirty="0"/>
-              <a:t>13.01.2018</a:t>
+              <a:t>14.01.2018</a:t>
             </a:fld>
             <a:endParaRPr lang="en-US" dirty="0"/>
           </a:p>
@@ -8519,7 +8521,7 @@
             <a:fld id="{B61BEF0D-F0BB-DE4B-95CE-6DB70DBA9567}" type="datetimeFigureOut">
               <a:rPr lang="en-US" dirty="0"/>
               <a:pPr/>
-              <a:t>13.01.2018</a:t>
+              <a:t>14.01.2018</a:t>
             </a:fld>
             <a:endParaRPr lang="en-US" dirty="0"/>
           </a:p>
@@ -8639,7 +8641,7 @@
             <a:fld id="{B61BEF0D-F0BB-DE4B-95CE-6DB70DBA9567}" type="datetimeFigureOut">
               <a:rPr lang="en-US" dirty="0"/>
               <a:pPr/>
-              <a:t>13.01.2018</a:t>
+              <a:t>14.01.2018</a:t>
             </a:fld>
             <a:endParaRPr lang="en-US" dirty="0"/>
           </a:p>
@@ -8731,7 +8733,7 @@
             <a:fld id="{B61BEF0D-F0BB-DE4B-95CE-6DB70DBA9567}" type="datetimeFigureOut">
               <a:rPr lang="en-US" dirty="0"/>
               <a:pPr/>
-              <a:t>13.01.2018</a:t>
+              <a:t>14.01.2018</a:t>
             </a:fld>
             <a:endParaRPr lang="en-US" dirty="0"/>
           </a:p>
@@ -8982,7 +8984,7 @@
           <a:p>
             <a:fld id="{42A54C80-263E-416B-A8E0-580EDEADCBDC}" type="datetimeFigureOut">
               <a:rPr lang="en-US" dirty="0"/>
-              <a:t>13.01.2018</a:t>
+              <a:t>14.01.2018</a:t>
             </a:fld>
             <a:endParaRPr lang="en-US" dirty="0"/>
           </a:p>
@@ -9241,7 +9243,7 @@
             <a:fld id="{B61BEF0D-F0BB-DE4B-95CE-6DB70DBA9567}" type="datetimeFigureOut">
               <a:rPr lang="en-US" dirty="0"/>
               <a:pPr/>
-              <a:t>13.01.2018</a:t>
+              <a:t>14.01.2018</a:t>
             </a:fld>
             <a:endParaRPr lang="en-US" dirty="0"/>
           </a:p>
@@ -9983,7 +9985,7 @@
             <a:fld id="{B61BEF0D-F0BB-DE4B-95CE-6DB70DBA9567}" type="datetimeFigureOut">
               <a:rPr lang="en-US" dirty="0"/>
               <a:pPr/>
-              <a:t>13.01.2018</a:t>
+              <a:t>14.01.2018</a:t>
             </a:fld>
             <a:endParaRPr lang="en-US" dirty="0"/>
           </a:p>
@@ -16681,7 +16683,7 @@
                   <a:schemeClr val="tx1"/>
                 </a:solidFill>
               </a:rPr>
-              <a:t>Spring offer a few providers</a:t>
+              <a:t>Spring offers a few providers</a:t>
             </a:r>
             <a:r>
               <a:rPr lang="en-US" i="1" dirty="0">
@@ -17091,6 +17093,327 @@
           <p:cNvPr id="2" name="Title 1">
             <a:extLst>
               <a:ext uri="{FF2B5EF4-FFF2-40B4-BE49-F238E27FC236}">
+                <a16:creationId xmlns:a16="http://schemas.microsoft.com/office/drawing/2014/main" id="{C93B4F0A-9765-4A24-9B7B-EACF300B5E87}"/>
+              </a:ext>
+            </a:extLst>
+          </p:cNvPr>
+          <p:cNvSpPr>
+            <a:spLocks noGrp="1"/>
+          </p:cNvSpPr>
+          <p:nvPr>
+            <p:ph type="title"/>
+          </p:nvPr>
+        </p:nvSpPr>
+        <p:spPr/>
+        <p:txBody>
+          <a:bodyPr/>
+          <a:lstStyle/>
+          <a:p>
+            <a:r>
+              <a:rPr lang="en-US" dirty="0"/>
+              <a:t>Spring-cache	</a:t>
+            </a:r>
+          </a:p>
+        </p:txBody>
+      </p:sp>
+      <p:sp>
+        <p:nvSpPr>
+          <p:cNvPr id="3" name="Content Placeholder 2">
+            <a:extLst>
+              <a:ext uri="{FF2B5EF4-FFF2-40B4-BE49-F238E27FC236}">
+                <a16:creationId xmlns:a16="http://schemas.microsoft.com/office/drawing/2014/main" id="{10D85333-F63B-43B8-8AFD-5E28CE9D8F28}"/>
+              </a:ext>
+            </a:extLst>
+          </p:cNvPr>
+          <p:cNvSpPr>
+            <a:spLocks noGrp="1"/>
+          </p:cNvSpPr>
+          <p:nvPr>
+            <p:ph idx="1"/>
+          </p:nvPr>
+        </p:nvSpPr>
+        <p:spPr>
+          <a:xfrm>
+            <a:off x="677334" y="1526797"/>
+            <a:ext cx="8596668" cy="4514566"/>
+          </a:xfrm>
+        </p:spPr>
+        <p:txBody>
+          <a:bodyPr>
+            <a:normAutofit/>
+          </a:bodyPr>
+          <a:lstStyle/>
+          <a:p>
+            <a:r>
+              <a:rPr lang="en-US" dirty="0"/>
+              <a:t>Spring cache provides a declarative caching mechanism.</a:t>
+            </a:r>
+          </a:p>
+          <a:p>
+            <a:r>
+              <a:rPr lang="en-US" dirty="0"/>
+              <a:t>How to enable it?</a:t>
+            </a:r>
+          </a:p>
+          <a:p>
+            <a:pPr lvl="1"/>
+            <a:r>
+              <a:rPr lang="en-US" dirty="0"/>
+              <a:t>Including dependency </a:t>
+            </a:r>
+            <a:r>
+              <a:rPr lang="en-US" dirty="0">
+                <a:solidFill>
+                  <a:schemeClr val="accent1">
+                    <a:lumMod val="60000"/>
+                    <a:lumOff val="40000"/>
+                  </a:schemeClr>
+                </a:solidFill>
+              </a:rPr>
+              <a:t>`spring-boot-starter-cache`</a:t>
+            </a:r>
+          </a:p>
+          <a:p>
+            <a:pPr lvl="1"/>
+            <a:r>
+              <a:rPr lang="en-US" dirty="0">
+                <a:solidFill>
+                  <a:schemeClr val="tx1"/>
+                </a:solidFill>
+              </a:rPr>
+              <a:t>Put annotation</a:t>
+            </a:r>
+            <a:r>
+              <a:rPr lang="en-US" dirty="0">
+                <a:solidFill>
+                  <a:schemeClr val="accent1">
+                    <a:lumMod val="60000"/>
+                    <a:lumOff val="40000"/>
+                  </a:schemeClr>
+                </a:solidFill>
+              </a:rPr>
+              <a:t> </a:t>
+            </a:r>
+            <a:r>
+              <a:rPr lang="en-US" i="1" dirty="0">
+                <a:solidFill>
+                  <a:schemeClr val="accent1">
+                    <a:lumMod val="60000"/>
+                    <a:lumOff val="40000"/>
+                  </a:schemeClr>
+                </a:solidFill>
+              </a:rPr>
+              <a:t>@</a:t>
+            </a:r>
+            <a:r>
+              <a:rPr lang="en-US" i="1" dirty="0" err="1">
+                <a:solidFill>
+                  <a:schemeClr val="accent1">
+                    <a:lumMod val="60000"/>
+                    <a:lumOff val="40000"/>
+                  </a:schemeClr>
+                </a:solidFill>
+              </a:rPr>
+              <a:t>EnableCaching</a:t>
+            </a:r>
+            <a:r>
+              <a:rPr lang="en-US" i="1" dirty="0">
+                <a:solidFill>
+                  <a:schemeClr val="accent1">
+                    <a:lumMod val="60000"/>
+                    <a:lumOff val="40000"/>
+                  </a:schemeClr>
+                </a:solidFill>
+              </a:rPr>
+              <a:t> </a:t>
+            </a:r>
+            <a:r>
+              <a:rPr lang="en-US" dirty="0">
+                <a:solidFill>
+                  <a:schemeClr val="tx1"/>
+                </a:solidFill>
+              </a:rPr>
+              <a:t>to configuration/application class</a:t>
+            </a:r>
+          </a:p>
+          <a:p>
+            <a:r>
+              <a:rPr lang="en-US" dirty="0">
+                <a:solidFill>
+                  <a:schemeClr val="tx1"/>
+                </a:solidFill>
+              </a:rPr>
+              <a:t>To apply and work with cache only following annotations are needed</a:t>
+            </a:r>
+          </a:p>
+          <a:p>
+            <a:pPr lvl="1"/>
+            <a:r>
+              <a:rPr lang="en-US" i="1" dirty="0">
+                <a:solidFill>
+                  <a:schemeClr val="accent1">
+                    <a:lumMod val="60000"/>
+                    <a:lumOff val="40000"/>
+                  </a:schemeClr>
+                </a:solidFill>
+              </a:rPr>
+              <a:t>@</a:t>
+            </a:r>
+            <a:r>
+              <a:rPr lang="en-US" i="1" dirty="0" err="1">
+                <a:solidFill>
+                  <a:schemeClr val="accent1">
+                    <a:lumMod val="60000"/>
+                    <a:lumOff val="40000"/>
+                  </a:schemeClr>
+                </a:solidFill>
+              </a:rPr>
+              <a:t>Cachable</a:t>
+            </a:r>
+            <a:r>
+              <a:rPr lang="en-US" dirty="0">
+                <a:solidFill>
+                  <a:schemeClr val="tx1"/>
+                </a:solidFill>
+              </a:rPr>
+              <a:t> – put method result to the cache first time, every next time returns the result from cache(without executing method)</a:t>
+            </a:r>
+          </a:p>
+          <a:p>
+            <a:pPr lvl="1"/>
+            <a:r>
+              <a:rPr lang="en-US" i="1" dirty="0">
+                <a:solidFill>
+                  <a:schemeClr val="accent1">
+                    <a:lumMod val="60000"/>
+                    <a:lumOff val="40000"/>
+                  </a:schemeClr>
+                </a:solidFill>
+              </a:rPr>
+              <a:t>@</a:t>
+            </a:r>
+            <a:r>
+              <a:rPr lang="en-US" i="1" dirty="0" err="1">
+                <a:solidFill>
+                  <a:schemeClr val="accent1">
+                    <a:lumMod val="60000"/>
+                    <a:lumOff val="40000"/>
+                  </a:schemeClr>
+                </a:solidFill>
+              </a:rPr>
+              <a:t>CachePut</a:t>
+            </a:r>
+            <a:r>
+              <a:rPr lang="en-US" dirty="0">
+                <a:solidFill>
+                  <a:schemeClr val="tx1"/>
+                </a:solidFill>
+              </a:rPr>
+              <a:t> – put result into cache, and execute method every time.</a:t>
+            </a:r>
+          </a:p>
+          <a:p>
+            <a:pPr lvl="1"/>
+            <a:r>
+              <a:rPr lang="en-US" i="1" dirty="0">
+                <a:solidFill>
+                  <a:schemeClr val="accent1">
+                    <a:lumMod val="60000"/>
+                    <a:lumOff val="40000"/>
+                  </a:schemeClr>
+                </a:solidFill>
+              </a:rPr>
+              <a:t>@</a:t>
+            </a:r>
+            <a:r>
+              <a:rPr lang="en-US" i="1" dirty="0" err="1">
+                <a:solidFill>
+                  <a:schemeClr val="accent1">
+                    <a:lumMod val="60000"/>
+                    <a:lumOff val="40000"/>
+                  </a:schemeClr>
+                </a:solidFill>
+              </a:rPr>
+              <a:t>CacheEvict</a:t>
+            </a:r>
+            <a:r>
+              <a:rPr lang="en-US" dirty="0">
+                <a:solidFill>
+                  <a:schemeClr val="tx1"/>
+                </a:solidFill>
+              </a:rPr>
+              <a:t> – remove object from cache</a:t>
+            </a:r>
+          </a:p>
+          <a:p>
+            <a:pPr lvl="1"/>
+            <a:r>
+              <a:rPr lang="en-US" i="1" dirty="0">
+                <a:solidFill>
+                  <a:schemeClr val="accent1">
+                    <a:lumMod val="60000"/>
+                    <a:lumOff val="40000"/>
+                  </a:schemeClr>
+                </a:solidFill>
+              </a:rPr>
+              <a:t>@Caching</a:t>
+            </a:r>
+            <a:r>
+              <a:rPr lang="en-US" dirty="0">
+                <a:solidFill>
+                  <a:schemeClr val="tx1"/>
+                </a:solidFill>
+              </a:rPr>
+              <a:t> – allow multiple cache operation </a:t>
+            </a:r>
+          </a:p>
+          <a:p>
+            <a:r>
+              <a:rPr lang="en-US" dirty="0">
+                <a:solidFill>
+                  <a:schemeClr val="tx1"/>
+                </a:solidFill>
+              </a:rPr>
+              <a:t>Where to apply cache ? And caching problems ? </a:t>
+            </a:r>
+          </a:p>
+        </p:txBody>
+      </p:sp>
+    </p:spTree>
+    <p:extLst>
+      <p:ext uri="{BB962C8B-B14F-4D97-AF65-F5344CB8AC3E}">
+        <p14:creationId xmlns:p14="http://schemas.microsoft.com/office/powerpoint/2010/main" val="2779557647"/>
+      </p:ext>
+    </p:extLst>
+  </p:cSld>
+  <p:clrMapOvr>
+    <a:masterClrMapping/>
+  </p:clrMapOvr>
+</p:sld>
+</file>
+
+<file path=ppt/slides/slide31.xml><?xml version="1.0" encoding="utf-8"?>
+<p:sld xmlns:a="http://schemas.openxmlformats.org/drawingml/2006/main" xmlns:r="http://schemas.openxmlformats.org/officeDocument/2006/relationships" xmlns:p="http://schemas.openxmlformats.org/presentationml/2006/main">
+  <p:cSld>
+    <p:spTree>
+      <p:nvGrpSpPr>
+        <p:cNvPr id="1" name=""/>
+        <p:cNvGrpSpPr/>
+        <p:nvPr/>
+      </p:nvGrpSpPr>
+      <p:grpSpPr>
+        <a:xfrm>
+          <a:off x="0" y="0"/>
+          <a:ext cx="0" cy="0"/>
+          <a:chOff x="0" y="0"/>
+          <a:chExt cx="0" cy="0"/>
+        </a:xfrm>
+      </p:grpSpPr>
+      <p:sp>
+        <p:nvSpPr>
+          <p:cNvPr id="2" name="Title 1">
+            <a:extLst>
+              <a:ext uri="{FF2B5EF4-FFF2-40B4-BE49-F238E27FC236}">
                 <a16:creationId xmlns:a16="http://schemas.microsoft.com/office/drawing/2014/main" id="{42AACF40-1801-4FE7-8352-C5D6505C283B}"/>
               </a:ext>
             </a:extLst>
@@ -17158,7 +17481,7 @@
 </p:sld>
 </file>
 
-<file path=ppt/slides/slide31.xml><?xml version="1.0" encoding="utf-8"?>
+<file path=ppt/slides/slide32.xml><?xml version="1.0" encoding="utf-8"?>
 <p:sld xmlns:a="http://schemas.openxmlformats.org/drawingml/2006/main" xmlns:r="http://schemas.openxmlformats.org/officeDocument/2006/relationships" xmlns:p="http://schemas.openxmlformats.org/presentationml/2006/main">
   <p:cSld>
     <p:spTree>

</xml_diff>

<commit_message>
redist value and sorted list examples
</commit_message>
<xml_diff>
--- a/documentation/SpringBoot.pptx
+++ b/documentation/SpringBoot.pptx
@@ -35,8 +35,9 @@
     <p:sldId id="288" r:id="rId29"/>
     <p:sldId id="289" r:id="rId30"/>
     <p:sldId id="290" r:id="rId31"/>
-    <p:sldId id="274" r:id="rId32"/>
-    <p:sldId id="285" r:id="rId33"/>
+    <p:sldId id="291" r:id="rId32"/>
+    <p:sldId id="274" r:id="rId33"/>
+    <p:sldId id="285" r:id="rId34"/>
   </p:sldIdLst>
   <p:sldSz cx="12192000" cy="6858000"/>
   <p:notesSz cx="6858000" cy="9144000"/>
@@ -170,6 +171,7 @@
             <p14:sldId id="288"/>
             <p14:sldId id="289"/>
             <p14:sldId id="290"/>
+            <p14:sldId id="291"/>
           </p14:sldIdLst>
         </p14:section>
         <p14:section name="Popups" id="{0E31B68C-B07E-4497-B09D-B16B0C92DA63}">
@@ -5586,7 +5588,7 @@
             <a:fld id="{B61BEF0D-F0BB-DE4B-95CE-6DB70DBA9567}" type="datetimeFigureOut">
               <a:rPr lang="en-US" dirty="0"/>
               <a:pPr/>
-              <a:t>14.01.2018</a:t>
+              <a:t>15.01.2018</a:t>
             </a:fld>
             <a:endParaRPr lang="en-US" dirty="0"/>
           </a:p>
@@ -5834,7 +5836,7 @@
             <a:fld id="{B61BEF0D-F0BB-DE4B-95CE-6DB70DBA9567}" type="datetimeFigureOut">
               <a:rPr lang="en-US" dirty="0"/>
               <a:pPr/>
-              <a:t>14.01.2018</a:t>
+              <a:t>15.01.2018</a:t>
             </a:fld>
             <a:endParaRPr lang="en-US" dirty="0"/>
           </a:p>
@@ -6145,7 +6147,7 @@
             <a:fld id="{B61BEF0D-F0BB-DE4B-95CE-6DB70DBA9567}" type="datetimeFigureOut">
               <a:rPr lang="en-US" dirty="0"/>
               <a:pPr/>
-              <a:t>14.01.2018</a:t>
+              <a:t>15.01.2018</a:t>
             </a:fld>
             <a:endParaRPr lang="en-US" dirty="0"/>
           </a:p>
@@ -6469,7 +6471,7 @@
             <a:fld id="{B61BEF0D-F0BB-DE4B-95CE-6DB70DBA9567}" type="datetimeFigureOut">
               <a:rPr lang="en-US" dirty="0"/>
               <a:pPr/>
-              <a:t>14.01.2018</a:t>
+              <a:t>15.01.2018</a:t>
             </a:fld>
             <a:endParaRPr lang="en-US" dirty="0"/>
           </a:p>
@@ -6780,7 +6782,7 @@
             <a:fld id="{B61BEF0D-F0BB-DE4B-95CE-6DB70DBA9567}" type="datetimeFigureOut">
               <a:rPr lang="en-US" dirty="0"/>
               <a:pPr/>
-              <a:t>14.01.2018</a:t>
+              <a:t>15.01.2018</a:t>
             </a:fld>
             <a:endParaRPr lang="en-US" dirty="0"/>
           </a:p>
@@ -7164,7 +7166,7 @@
             <a:fld id="{B61BEF0D-F0BB-DE4B-95CE-6DB70DBA9567}" type="datetimeFigureOut">
               <a:rPr lang="en-US" dirty="0"/>
               <a:pPr/>
-              <a:t>14.01.2018</a:t>
+              <a:t>15.01.2018</a:t>
             </a:fld>
             <a:endParaRPr lang="en-US" dirty="0"/>
           </a:p>
@@ -7330,7 +7332,7 @@
           <a:p>
             <a:fld id="{55C6B4A9-1611-4792-9094-5F34BCA07E0B}" type="datetimeFigureOut">
               <a:rPr lang="en-US" dirty="0"/>
-              <a:t>14.01.2018</a:t>
+              <a:t>15.01.2018</a:t>
             </a:fld>
             <a:endParaRPr lang="en-US" dirty="0"/>
           </a:p>
@@ -7506,7 +7508,7 @@
             <a:fld id="{B61BEF0D-F0BB-DE4B-95CE-6DB70DBA9567}" type="datetimeFigureOut">
               <a:rPr lang="en-US" dirty="0"/>
               <a:pPr/>
-              <a:t>14.01.2018</a:t>
+              <a:t>15.01.2018</a:t>
             </a:fld>
             <a:endParaRPr lang="en-US" dirty="0"/>
           </a:p>
@@ -7679,7 +7681,7 @@
             <a:fld id="{B61BEF0D-F0BB-DE4B-95CE-6DB70DBA9567}" type="datetimeFigureOut">
               <a:rPr lang="en-US" dirty="0"/>
               <a:pPr/>
-              <a:t>14.01.2018</a:t>
+              <a:t>15.01.2018</a:t>
             </a:fld>
             <a:endParaRPr lang="en-US" dirty="0"/>
           </a:p>
@@ -7923,7 +7925,7 @@
             <a:fld id="{B61BEF0D-F0BB-DE4B-95CE-6DB70DBA9567}" type="datetimeFigureOut">
               <a:rPr lang="en-US" dirty="0"/>
               <a:pPr/>
-              <a:t>14.01.2018</a:t>
+              <a:t>15.01.2018</a:t>
             </a:fld>
             <a:endParaRPr lang="en-US" dirty="0"/>
           </a:p>
@@ -8151,7 +8153,7 @@
           <a:p>
             <a:fld id="{EB712588-04B1-427B-82EE-E8DB90309F08}" type="datetimeFigureOut">
               <a:rPr lang="en-US" dirty="0"/>
-              <a:t>14.01.2018</a:t>
+              <a:t>15.01.2018</a:t>
             </a:fld>
             <a:endParaRPr lang="en-US" dirty="0"/>
           </a:p>
@@ -8521,7 +8523,7 @@
             <a:fld id="{B61BEF0D-F0BB-DE4B-95CE-6DB70DBA9567}" type="datetimeFigureOut">
               <a:rPr lang="en-US" dirty="0"/>
               <a:pPr/>
-              <a:t>14.01.2018</a:t>
+              <a:t>15.01.2018</a:t>
             </a:fld>
             <a:endParaRPr lang="en-US" dirty="0"/>
           </a:p>
@@ -8641,7 +8643,7 @@
             <a:fld id="{B61BEF0D-F0BB-DE4B-95CE-6DB70DBA9567}" type="datetimeFigureOut">
               <a:rPr lang="en-US" dirty="0"/>
               <a:pPr/>
-              <a:t>14.01.2018</a:t>
+              <a:t>15.01.2018</a:t>
             </a:fld>
             <a:endParaRPr lang="en-US" dirty="0"/>
           </a:p>
@@ -8733,7 +8735,7 @@
             <a:fld id="{B61BEF0D-F0BB-DE4B-95CE-6DB70DBA9567}" type="datetimeFigureOut">
               <a:rPr lang="en-US" dirty="0"/>
               <a:pPr/>
-              <a:t>14.01.2018</a:t>
+              <a:t>15.01.2018</a:t>
             </a:fld>
             <a:endParaRPr lang="en-US" dirty="0"/>
           </a:p>
@@ -8984,7 +8986,7 @@
           <a:p>
             <a:fld id="{42A54C80-263E-416B-A8E0-580EDEADCBDC}" type="datetimeFigureOut">
               <a:rPr lang="en-US" dirty="0"/>
-              <a:t>14.01.2018</a:t>
+              <a:t>15.01.2018</a:t>
             </a:fld>
             <a:endParaRPr lang="en-US" dirty="0"/>
           </a:p>
@@ -9243,7 +9245,7 @@
             <a:fld id="{B61BEF0D-F0BB-DE4B-95CE-6DB70DBA9567}" type="datetimeFigureOut">
               <a:rPr lang="en-US" dirty="0"/>
               <a:pPr/>
-              <a:t>14.01.2018</a:t>
+              <a:t>15.01.2018</a:t>
             </a:fld>
             <a:endParaRPr lang="en-US" dirty="0"/>
           </a:p>
@@ -9985,7 +9987,7 @@
             <a:fld id="{B61BEF0D-F0BB-DE4B-95CE-6DB70DBA9567}" type="datetimeFigureOut">
               <a:rPr lang="en-US" dirty="0"/>
               <a:pPr/>
-              <a:t>14.01.2018</a:t>
+              <a:t>15.01.2018</a:t>
             </a:fld>
             <a:endParaRPr lang="en-US" dirty="0"/>
           </a:p>
@@ -17374,7 +17376,7 @@
                   <a:schemeClr val="tx1"/>
                 </a:solidFill>
               </a:rPr>
-              <a:t>Where to apply cache ? And caching problems ? </a:t>
+              <a:t>Where to apply cache? Caching strategy and security problems ? </a:t>
             </a:r>
           </a:p>
         </p:txBody>
@@ -17393,6 +17395,152 @@
 </file>
 
 <file path=ppt/slides/slide31.xml><?xml version="1.0" encoding="utf-8"?>
+<p:sld xmlns:a="http://schemas.openxmlformats.org/drawingml/2006/main" xmlns:r="http://schemas.openxmlformats.org/officeDocument/2006/relationships" xmlns:p="http://schemas.openxmlformats.org/presentationml/2006/main">
+  <p:cSld>
+    <p:spTree>
+      <p:nvGrpSpPr>
+        <p:cNvPr id="1" name=""/>
+        <p:cNvGrpSpPr/>
+        <p:nvPr/>
+      </p:nvGrpSpPr>
+      <p:grpSpPr>
+        <a:xfrm>
+          <a:off x="0" y="0"/>
+          <a:ext cx="0" cy="0"/>
+          <a:chOff x="0" y="0"/>
+          <a:chExt cx="0" cy="0"/>
+        </a:xfrm>
+      </p:grpSpPr>
+      <p:sp>
+        <p:nvSpPr>
+          <p:cNvPr id="2" name="Title 1">
+            <a:extLst>
+              <a:ext uri="{FF2B5EF4-FFF2-40B4-BE49-F238E27FC236}">
+                <a16:creationId xmlns:a16="http://schemas.microsoft.com/office/drawing/2014/main" id="{DF0E5D3F-E654-4C76-B0A3-8454E268742E}"/>
+              </a:ext>
+            </a:extLst>
+          </p:cNvPr>
+          <p:cNvSpPr>
+            <a:spLocks noGrp="1"/>
+          </p:cNvSpPr>
+          <p:nvPr>
+            <p:ph type="title"/>
+          </p:nvPr>
+        </p:nvSpPr>
+        <p:spPr/>
+        <p:txBody>
+          <a:bodyPr/>
+          <a:lstStyle/>
+          <a:p>
+            <a:r>
+              <a:rPr lang="en-US" dirty="0"/>
+              <a:t>Redis</a:t>
+            </a:r>
+          </a:p>
+        </p:txBody>
+      </p:sp>
+      <p:sp>
+        <p:nvSpPr>
+          <p:cNvPr id="3" name="Content Placeholder 2">
+            <a:extLst>
+              <a:ext uri="{FF2B5EF4-FFF2-40B4-BE49-F238E27FC236}">
+                <a16:creationId xmlns:a16="http://schemas.microsoft.com/office/drawing/2014/main" id="{40A9DAB4-934B-41CB-914B-C1DCB0D30DE1}"/>
+              </a:ext>
+            </a:extLst>
+          </p:cNvPr>
+          <p:cNvSpPr>
+            <a:spLocks noGrp="1"/>
+          </p:cNvSpPr>
+          <p:nvPr>
+            <p:ph idx="1"/>
+          </p:nvPr>
+        </p:nvSpPr>
+        <p:spPr/>
+        <p:txBody>
+          <a:bodyPr/>
+          <a:lstStyle/>
+          <a:p>
+            <a:r>
+              <a:rPr lang="en-US" dirty="0"/>
+              <a:t>Redis is one of the most popular in-memory database. It is a </a:t>
+            </a:r>
+            <a:r>
+              <a:rPr lang="en-US" dirty="0" err="1"/>
+              <a:t>keystore</a:t>
+            </a:r>
+            <a:r>
+              <a:rPr lang="en-US" dirty="0"/>
+              <a:t>-data structure</a:t>
+            </a:r>
+          </a:p>
+          <a:p>
+            <a:r>
+              <a:rPr lang="en-US" dirty="0"/>
+              <a:t>Use cases:</a:t>
+            </a:r>
+          </a:p>
+          <a:p>
+            <a:pPr lvl="1" fontAlgn="base"/>
+            <a:r>
+              <a:rPr lang="en-US" dirty="0"/>
+              <a:t>Cache -</a:t>
+            </a:r>
+          </a:p>
+          <a:p>
+            <a:pPr lvl="1" fontAlgn="base"/>
+            <a:r>
+              <a:rPr lang="en-US" dirty="0"/>
+              <a:t>Messaging - publisher/subscriber</a:t>
+            </a:r>
+          </a:p>
+          <a:p>
+            <a:pPr lvl="1" fontAlgn="base"/>
+            <a:r>
+              <a:rPr lang="en-US" dirty="0"/>
+              <a:t>Distributed session/access token</a:t>
+            </a:r>
+          </a:p>
+          <a:p>
+            <a:pPr lvl="1" fontAlgn="base"/>
+            <a:r>
+              <a:rPr lang="en-US" dirty="0"/>
+              <a:t>Temporary data with TTL - i.e. reservation, user block, voting system one per day</a:t>
+            </a:r>
+          </a:p>
+          <a:p>
+            <a:pPr lvl="1" fontAlgn="base"/>
+            <a:r>
+              <a:rPr lang="en-US" dirty="0"/>
+              <a:t>Real-time access data - </a:t>
+            </a:r>
+            <a:r>
+              <a:rPr lang="en-US"/>
+              <a:t>inventory, </a:t>
+            </a:r>
+            <a:r>
+              <a:rPr lang="en-US" dirty="0"/>
+              <a:t>product prices.</a:t>
+            </a:r>
+          </a:p>
+          <a:p>
+            <a:endParaRPr lang="en-US" dirty="0"/>
+          </a:p>
+        </p:txBody>
+      </p:sp>
+    </p:spTree>
+    <p:extLst>
+      <p:ext uri="{BB962C8B-B14F-4D97-AF65-F5344CB8AC3E}">
+        <p14:creationId xmlns:p14="http://schemas.microsoft.com/office/powerpoint/2010/main" val="1306622416"/>
+      </p:ext>
+    </p:extLst>
+  </p:cSld>
+  <p:clrMapOvr>
+    <a:masterClrMapping/>
+  </p:clrMapOvr>
+</p:sld>
+</file>
+
+<file path=ppt/slides/slide32.xml><?xml version="1.0" encoding="utf-8"?>
 <p:sld xmlns:a="http://schemas.openxmlformats.org/drawingml/2006/main" xmlns:r="http://schemas.openxmlformats.org/officeDocument/2006/relationships" xmlns:p="http://schemas.openxmlformats.org/presentationml/2006/main">
   <p:cSld>
     <p:spTree>
@@ -17481,7 +17629,7 @@
 </p:sld>
 </file>
 
-<file path=ppt/slides/slide32.xml><?xml version="1.0" encoding="utf-8"?>
+<file path=ppt/slides/slide33.xml><?xml version="1.0" encoding="utf-8"?>
 <p:sld xmlns:a="http://schemas.openxmlformats.org/drawingml/2006/main" xmlns:r="http://schemas.openxmlformats.org/officeDocument/2006/relationships" xmlns:p="http://schemas.openxmlformats.org/presentationml/2006/main">
   <p:cSld>
     <p:spTree>

</xml_diff>

<commit_message>
create a dummy authentitication provider
</commit_message>
<xml_diff>
--- a/documentation/SpringBoot.pptx
+++ b/documentation/SpringBoot.pptx
@@ -17455,74 +17455,179 @@
             <p:ph idx="1"/>
           </p:nvPr>
         </p:nvSpPr>
-        <p:spPr/>
+        <p:spPr>
+          <a:xfrm>
+            <a:off x="677334" y="1426129"/>
+            <a:ext cx="8596668" cy="5016616"/>
+          </a:xfrm>
+        </p:spPr>
         <p:txBody>
-          <a:bodyPr/>
+          <a:bodyPr>
+            <a:normAutofit fontScale="85000" lnSpcReduction="20000"/>
+          </a:bodyPr>
           <a:lstStyle/>
           <a:p>
             <a:r>
               <a:rPr lang="en-US" dirty="0"/>
-              <a:t>Redis is one of the most popular in-memory database. It is a </a:t>
-            </a:r>
+              <a:t>Redis is one of the most popular in-memory key-data-structure database.</a:t>
+            </a:r>
+          </a:p>
+          <a:p>
+            <a:r>
+              <a:rPr lang="en-US" dirty="0"/>
+              <a:t>Use cases:</a:t>
+            </a:r>
+          </a:p>
+          <a:p>
+            <a:pPr lvl="1" fontAlgn="base"/>
+            <a:r>
+              <a:rPr lang="en-US" dirty="0"/>
+              <a:t>Cache</a:t>
+            </a:r>
+          </a:p>
+          <a:p>
+            <a:pPr lvl="1" fontAlgn="base"/>
+            <a:r>
+              <a:rPr lang="en-US" dirty="0"/>
+              <a:t>Messaging - publisher/subscriber</a:t>
+            </a:r>
+          </a:p>
+          <a:p>
+            <a:pPr lvl="1" fontAlgn="base"/>
+            <a:r>
+              <a:rPr lang="en-US" dirty="0"/>
+              <a:t>Distributed session/access token</a:t>
+            </a:r>
+          </a:p>
+          <a:p>
+            <a:pPr lvl="1" fontAlgn="base"/>
+            <a:r>
+              <a:rPr lang="en-US" dirty="0"/>
+              <a:t>Temporary data with TTL - i.e. reservation, user block, voting system one per day</a:t>
+            </a:r>
+          </a:p>
+          <a:p>
+            <a:pPr lvl="1" fontAlgn="base"/>
+            <a:r>
+              <a:rPr lang="en-US" dirty="0"/>
+              <a:t>Real-time access data - inventory, product prices.</a:t>
+            </a:r>
+          </a:p>
+          <a:p>
+            <a:r>
+              <a:rPr lang="en-US" dirty="0"/>
+              <a:t>Data structures:</a:t>
+            </a:r>
+          </a:p>
+          <a:p>
+            <a:pPr lvl="1" fontAlgn="base"/>
+            <a:r>
+              <a:rPr lang="en-US" dirty="0"/>
+              <a:t>String - store values as string, ops: SET,GET, SETNX, INCR, </a:t>
+            </a:r>
+            <a:r>
+              <a:rPr lang="en-US" u="sng" dirty="0" err="1">
+                <a:hlinkClick r:id="rId2"/>
+              </a:rPr>
+              <a:t>etc</a:t>
+            </a:r>
+            <a:endParaRPr lang="en-US" u="sng" dirty="0"/>
+          </a:p>
+          <a:p>
+            <a:pPr lvl="1" fontAlgn="base"/>
+            <a:r>
+              <a:rPr lang="en-US" dirty="0"/>
+              <a:t>List - list of strings, Ops: LPUSH, LPOP, LLEN, </a:t>
+            </a:r>
+            <a:r>
+              <a:rPr lang="en-US" u="sng" dirty="0" err="1">
+                <a:hlinkClick r:id="rId3"/>
+              </a:rPr>
+              <a:t>etc</a:t>
+            </a:r>
+            <a:endParaRPr lang="en-US" u="sng" dirty="0"/>
+          </a:p>
+          <a:p>
+            <a:pPr lvl="1" fontAlgn="base"/>
+            <a:r>
+              <a:rPr lang="en-US" dirty="0"/>
+              <a:t>Set - unordered collection of strings with no repetition. SADD, SUNION, SINTER, </a:t>
+            </a:r>
+            <a:r>
+              <a:rPr lang="en-US" u="sng" dirty="0" err="1">
+                <a:hlinkClick r:id="rId4"/>
+              </a:rPr>
+              <a:t>etc</a:t>
+            </a:r>
+            <a:endParaRPr lang="en-US" dirty="0"/>
+          </a:p>
+          <a:p>
+            <a:pPr lvl="1" fontAlgn="base"/>
             <a:r>
               <a:rPr lang="en-US" dirty="0" err="1"/>
-              <a:t>keystore</a:t>
-            </a:r>
-            <a:r>
-              <a:rPr lang="en-US" dirty="0"/>
-              <a:t>-data structure</a:t>
-            </a:r>
-          </a:p>
-          <a:p>
-            <a:r>
-              <a:rPr lang="en-US" dirty="0"/>
-              <a:t>Use cases:</a:t>
-            </a:r>
+              <a:t>SortedSet</a:t>
+            </a:r>
+            <a:r>
+              <a:rPr lang="en-US" dirty="0"/>
+              <a:t> - ordered collection of strings with no repetition. ZADD, ZRANGEBYSCORE, </a:t>
+            </a:r>
+            <a:r>
+              <a:rPr lang="en-US" u="sng" dirty="0" err="1">
+                <a:hlinkClick r:id="rId4"/>
+              </a:rPr>
+              <a:t>etc</a:t>
+            </a:r>
+            <a:endParaRPr lang="en-US" dirty="0"/>
           </a:p>
           <a:p>
             <a:pPr lvl="1" fontAlgn="base"/>
             <a:r>
-              <a:rPr lang="en-US" dirty="0"/>
-              <a:t>Cache -</a:t>
+              <a:rPr lang="en-US" dirty="0" err="1"/>
+              <a:t>Hashe</a:t>
+            </a:r>
+            <a:r>
+              <a:rPr lang="en-US" dirty="0"/>
+              <a:t> - is map between key and string value. HSET, HGET, HINCRBY, </a:t>
+            </a:r>
+            <a:r>
+              <a:rPr lang="en-US" u="sng" dirty="0" err="1">
+                <a:hlinkClick r:id="rId5"/>
+              </a:rPr>
+              <a:t>etc</a:t>
+            </a:r>
+            <a:r>
+              <a:rPr lang="en-US" dirty="0"/>
+              <a:t> </a:t>
+            </a:r>
+          </a:p>
+          <a:p>
+            <a:pPr fontAlgn="base"/>
+            <a:r>
+              <a:rPr lang="en-US" dirty="0"/>
+              <a:t>Limitations: </a:t>
             </a:r>
           </a:p>
           <a:p>
             <a:pPr lvl="1" fontAlgn="base"/>
             <a:r>
               <a:rPr lang="en-US" dirty="0"/>
-              <a:t>Messaging - publisher/subscriber</a:t>
+              <a:t>Values up to 512MB</a:t>
             </a:r>
           </a:p>
           <a:p>
             <a:pPr lvl="1" fontAlgn="base"/>
             <a:r>
               <a:rPr lang="en-US" dirty="0"/>
-              <a:t>Distributed session/access token</a:t>
-            </a:r>
-          </a:p>
-          <a:p>
-            <a:pPr lvl="1" fontAlgn="base"/>
-            <a:r>
-              <a:rPr lang="en-US" dirty="0"/>
-              <a:t>Temporary data with TTL - i.e. reservation, user block, voting system one per day</a:t>
-            </a:r>
-          </a:p>
-          <a:p>
-            <a:pPr lvl="1" fontAlgn="base"/>
-            <a:r>
-              <a:rPr lang="en-US" dirty="0"/>
-              <a:t>Real-time access data - </a:t>
+              <a:t>Collections up to 2^32-1 ( more than 4 billion </a:t>
             </a:r>
             <a:r>
               <a:rPr lang="en-US"/>
-              <a:t>inventory, </a:t>
-            </a:r>
-            <a:r>
-              <a:rPr lang="en-US" dirty="0"/>
-              <a:t>product prices.</a:t>
-            </a:r>
-          </a:p>
-          <a:p>
+              <a:t>) elements</a:t>
+            </a:r>
+            <a:endParaRPr lang="en-US" dirty="0"/>
+          </a:p>
+          <a:p>
+            <a:pPr lvl="1"/>
             <a:endParaRPr lang="en-US" dirty="0"/>
           </a:p>
         </p:txBody>

</xml_diff>

<commit_message>
Quick fix for Test&Cache&Interface issue
</commit_message>
<xml_diff>
--- a/documentation/SpringBoot.pptx
+++ b/documentation/SpringBoot.pptx
@@ -5588,7 +5588,7 @@
             <a:fld id="{B61BEF0D-F0BB-DE4B-95CE-6DB70DBA9567}" type="datetimeFigureOut">
               <a:rPr lang="en-US" dirty="0"/>
               <a:pPr/>
-              <a:t>15.01.2018</a:t>
+              <a:t>16.01.2018</a:t>
             </a:fld>
             <a:endParaRPr lang="en-US" dirty="0"/>
           </a:p>
@@ -5836,7 +5836,7 @@
             <a:fld id="{B61BEF0D-F0BB-DE4B-95CE-6DB70DBA9567}" type="datetimeFigureOut">
               <a:rPr lang="en-US" dirty="0"/>
               <a:pPr/>
-              <a:t>15.01.2018</a:t>
+              <a:t>16.01.2018</a:t>
             </a:fld>
             <a:endParaRPr lang="en-US" dirty="0"/>
           </a:p>
@@ -6147,7 +6147,7 @@
             <a:fld id="{B61BEF0D-F0BB-DE4B-95CE-6DB70DBA9567}" type="datetimeFigureOut">
               <a:rPr lang="en-US" dirty="0"/>
               <a:pPr/>
-              <a:t>15.01.2018</a:t>
+              <a:t>16.01.2018</a:t>
             </a:fld>
             <a:endParaRPr lang="en-US" dirty="0"/>
           </a:p>
@@ -6471,7 +6471,7 @@
             <a:fld id="{B61BEF0D-F0BB-DE4B-95CE-6DB70DBA9567}" type="datetimeFigureOut">
               <a:rPr lang="en-US" dirty="0"/>
               <a:pPr/>
-              <a:t>15.01.2018</a:t>
+              <a:t>16.01.2018</a:t>
             </a:fld>
             <a:endParaRPr lang="en-US" dirty="0"/>
           </a:p>
@@ -6782,7 +6782,7 @@
             <a:fld id="{B61BEF0D-F0BB-DE4B-95CE-6DB70DBA9567}" type="datetimeFigureOut">
               <a:rPr lang="en-US" dirty="0"/>
               <a:pPr/>
-              <a:t>15.01.2018</a:t>
+              <a:t>16.01.2018</a:t>
             </a:fld>
             <a:endParaRPr lang="en-US" dirty="0"/>
           </a:p>
@@ -7166,7 +7166,7 @@
             <a:fld id="{B61BEF0D-F0BB-DE4B-95CE-6DB70DBA9567}" type="datetimeFigureOut">
               <a:rPr lang="en-US" dirty="0"/>
               <a:pPr/>
-              <a:t>15.01.2018</a:t>
+              <a:t>16.01.2018</a:t>
             </a:fld>
             <a:endParaRPr lang="en-US" dirty="0"/>
           </a:p>
@@ -7332,7 +7332,7 @@
           <a:p>
             <a:fld id="{55C6B4A9-1611-4792-9094-5F34BCA07E0B}" type="datetimeFigureOut">
               <a:rPr lang="en-US" dirty="0"/>
-              <a:t>15.01.2018</a:t>
+              <a:t>16.01.2018</a:t>
             </a:fld>
             <a:endParaRPr lang="en-US" dirty="0"/>
           </a:p>
@@ -7508,7 +7508,7 @@
             <a:fld id="{B61BEF0D-F0BB-DE4B-95CE-6DB70DBA9567}" type="datetimeFigureOut">
               <a:rPr lang="en-US" dirty="0"/>
               <a:pPr/>
-              <a:t>15.01.2018</a:t>
+              <a:t>16.01.2018</a:t>
             </a:fld>
             <a:endParaRPr lang="en-US" dirty="0"/>
           </a:p>
@@ -7681,7 +7681,7 @@
             <a:fld id="{B61BEF0D-F0BB-DE4B-95CE-6DB70DBA9567}" type="datetimeFigureOut">
               <a:rPr lang="en-US" dirty="0"/>
               <a:pPr/>
-              <a:t>15.01.2018</a:t>
+              <a:t>16.01.2018</a:t>
             </a:fld>
             <a:endParaRPr lang="en-US" dirty="0"/>
           </a:p>
@@ -7925,7 +7925,7 @@
             <a:fld id="{B61BEF0D-F0BB-DE4B-95CE-6DB70DBA9567}" type="datetimeFigureOut">
               <a:rPr lang="en-US" dirty="0"/>
               <a:pPr/>
-              <a:t>15.01.2018</a:t>
+              <a:t>16.01.2018</a:t>
             </a:fld>
             <a:endParaRPr lang="en-US" dirty="0"/>
           </a:p>
@@ -8153,7 +8153,7 @@
           <a:p>
             <a:fld id="{EB712588-04B1-427B-82EE-E8DB90309F08}" type="datetimeFigureOut">
               <a:rPr lang="en-US" dirty="0"/>
-              <a:t>15.01.2018</a:t>
+              <a:t>16.01.2018</a:t>
             </a:fld>
             <a:endParaRPr lang="en-US" dirty="0"/>
           </a:p>
@@ -8523,7 +8523,7 @@
             <a:fld id="{B61BEF0D-F0BB-DE4B-95CE-6DB70DBA9567}" type="datetimeFigureOut">
               <a:rPr lang="en-US" dirty="0"/>
               <a:pPr/>
-              <a:t>15.01.2018</a:t>
+              <a:t>16.01.2018</a:t>
             </a:fld>
             <a:endParaRPr lang="en-US" dirty="0"/>
           </a:p>
@@ -8643,7 +8643,7 @@
             <a:fld id="{B61BEF0D-F0BB-DE4B-95CE-6DB70DBA9567}" type="datetimeFigureOut">
               <a:rPr lang="en-US" dirty="0"/>
               <a:pPr/>
-              <a:t>15.01.2018</a:t>
+              <a:t>16.01.2018</a:t>
             </a:fld>
             <a:endParaRPr lang="en-US" dirty="0"/>
           </a:p>
@@ -8735,7 +8735,7 @@
             <a:fld id="{B61BEF0D-F0BB-DE4B-95CE-6DB70DBA9567}" type="datetimeFigureOut">
               <a:rPr lang="en-US" dirty="0"/>
               <a:pPr/>
-              <a:t>15.01.2018</a:t>
+              <a:t>16.01.2018</a:t>
             </a:fld>
             <a:endParaRPr lang="en-US" dirty="0"/>
           </a:p>
@@ -8986,7 +8986,7 @@
           <a:p>
             <a:fld id="{42A54C80-263E-416B-A8E0-580EDEADCBDC}" type="datetimeFigureOut">
               <a:rPr lang="en-US" dirty="0"/>
-              <a:t>15.01.2018</a:t>
+              <a:t>16.01.2018</a:t>
             </a:fld>
             <a:endParaRPr lang="en-US" dirty="0"/>
           </a:p>
@@ -9245,7 +9245,7 @@
             <a:fld id="{B61BEF0D-F0BB-DE4B-95CE-6DB70DBA9567}" type="datetimeFigureOut">
               <a:rPr lang="en-US" dirty="0"/>
               <a:pPr/>
-              <a:t>15.01.2018</a:t>
+              <a:t>16.01.2018</a:t>
             </a:fld>
             <a:endParaRPr lang="en-US" dirty="0"/>
           </a:p>
@@ -9987,7 +9987,7 @@
             <a:fld id="{B61BEF0D-F0BB-DE4B-95CE-6DB70DBA9567}" type="datetimeFigureOut">
               <a:rPr lang="en-US" dirty="0"/>
               <a:pPr/>
-              <a:t>15.01.2018</a:t>
+              <a:t>16.01.2018</a:t>
             </a:fld>
             <a:endParaRPr lang="en-US" dirty="0"/>
           </a:p>
@@ -15128,7 +15128,15 @@
             <a:pPr lvl="1"/>
             <a:r>
               <a:rPr lang="en-US" dirty="0"/>
-              <a:t>Can be used file storage (grid file system 16MB+)</a:t>
+              <a:t>Can be </a:t>
+            </a:r>
+            <a:r>
+              <a:rPr lang="en-US"/>
+              <a:t>used as file </a:t>
+            </a:r>
+            <a:r>
+              <a:rPr lang="en-US" dirty="0"/>
+              <a:t>storage (grid file system 16MB+)</a:t>
             </a:r>
           </a:p>
           <a:p>

</xml_diff>

<commit_message>
add basic/proxy example, diagrams, prodyna presentation, neo4j examples, etc
</commit_message>
<xml_diff>
--- a/documentation/SpringBoot.pptx
+++ b/documentation/SpringBoot.pptx
@@ -36,8 +36,9 @@
     <p:sldId id="289" r:id="rId30"/>
     <p:sldId id="290" r:id="rId31"/>
     <p:sldId id="291" r:id="rId32"/>
-    <p:sldId id="274" r:id="rId33"/>
-    <p:sldId id="285" r:id="rId34"/>
+    <p:sldId id="292" r:id="rId33"/>
+    <p:sldId id="274" r:id="rId34"/>
+    <p:sldId id="285" r:id="rId35"/>
   </p:sldIdLst>
   <p:sldSz cx="12192000" cy="6858000"/>
   <p:notesSz cx="6858000" cy="9144000"/>
@@ -172,6 +173,7 @@
             <p14:sldId id="289"/>
             <p14:sldId id="290"/>
             <p14:sldId id="291"/>
+            <p14:sldId id="292"/>
           </p14:sldIdLst>
         </p14:section>
         <p14:section name="Popups" id="{0E31B68C-B07E-4497-B09D-B16B0C92DA63}">
@@ -5588,7 +5590,7 @@
             <a:fld id="{B61BEF0D-F0BB-DE4B-95CE-6DB70DBA9567}" type="datetimeFigureOut">
               <a:rPr lang="en-US" dirty="0"/>
               <a:pPr/>
-              <a:t>16.01.2018</a:t>
+              <a:t>01.02.2018</a:t>
             </a:fld>
             <a:endParaRPr lang="en-US" dirty="0"/>
           </a:p>
@@ -5836,7 +5838,7 @@
             <a:fld id="{B61BEF0D-F0BB-DE4B-95CE-6DB70DBA9567}" type="datetimeFigureOut">
               <a:rPr lang="en-US" dirty="0"/>
               <a:pPr/>
-              <a:t>16.01.2018</a:t>
+              <a:t>01.02.2018</a:t>
             </a:fld>
             <a:endParaRPr lang="en-US" dirty="0"/>
           </a:p>
@@ -6147,7 +6149,7 @@
             <a:fld id="{B61BEF0D-F0BB-DE4B-95CE-6DB70DBA9567}" type="datetimeFigureOut">
               <a:rPr lang="en-US" dirty="0"/>
               <a:pPr/>
-              <a:t>16.01.2018</a:t>
+              <a:t>01.02.2018</a:t>
             </a:fld>
             <a:endParaRPr lang="en-US" dirty="0"/>
           </a:p>
@@ -6471,7 +6473,7 @@
             <a:fld id="{B61BEF0D-F0BB-DE4B-95CE-6DB70DBA9567}" type="datetimeFigureOut">
               <a:rPr lang="en-US" dirty="0"/>
               <a:pPr/>
-              <a:t>16.01.2018</a:t>
+              <a:t>01.02.2018</a:t>
             </a:fld>
             <a:endParaRPr lang="en-US" dirty="0"/>
           </a:p>
@@ -6782,7 +6784,7 @@
             <a:fld id="{B61BEF0D-F0BB-DE4B-95CE-6DB70DBA9567}" type="datetimeFigureOut">
               <a:rPr lang="en-US" dirty="0"/>
               <a:pPr/>
-              <a:t>16.01.2018</a:t>
+              <a:t>01.02.2018</a:t>
             </a:fld>
             <a:endParaRPr lang="en-US" dirty="0"/>
           </a:p>
@@ -7166,7 +7168,7 @@
             <a:fld id="{B61BEF0D-F0BB-DE4B-95CE-6DB70DBA9567}" type="datetimeFigureOut">
               <a:rPr lang="en-US" dirty="0"/>
               <a:pPr/>
-              <a:t>16.01.2018</a:t>
+              <a:t>01.02.2018</a:t>
             </a:fld>
             <a:endParaRPr lang="en-US" dirty="0"/>
           </a:p>
@@ -7332,7 +7334,7 @@
           <a:p>
             <a:fld id="{55C6B4A9-1611-4792-9094-5F34BCA07E0B}" type="datetimeFigureOut">
               <a:rPr lang="en-US" dirty="0"/>
-              <a:t>16.01.2018</a:t>
+              <a:t>01.02.2018</a:t>
             </a:fld>
             <a:endParaRPr lang="en-US" dirty="0"/>
           </a:p>
@@ -7508,7 +7510,7 @@
             <a:fld id="{B61BEF0D-F0BB-DE4B-95CE-6DB70DBA9567}" type="datetimeFigureOut">
               <a:rPr lang="en-US" dirty="0"/>
               <a:pPr/>
-              <a:t>16.01.2018</a:t>
+              <a:t>01.02.2018</a:t>
             </a:fld>
             <a:endParaRPr lang="en-US" dirty="0"/>
           </a:p>
@@ -7681,7 +7683,7 @@
             <a:fld id="{B61BEF0D-F0BB-DE4B-95CE-6DB70DBA9567}" type="datetimeFigureOut">
               <a:rPr lang="en-US" dirty="0"/>
               <a:pPr/>
-              <a:t>16.01.2018</a:t>
+              <a:t>01.02.2018</a:t>
             </a:fld>
             <a:endParaRPr lang="en-US" dirty="0"/>
           </a:p>
@@ -7925,7 +7927,7 @@
             <a:fld id="{B61BEF0D-F0BB-DE4B-95CE-6DB70DBA9567}" type="datetimeFigureOut">
               <a:rPr lang="en-US" dirty="0"/>
               <a:pPr/>
-              <a:t>16.01.2018</a:t>
+              <a:t>01.02.2018</a:t>
             </a:fld>
             <a:endParaRPr lang="en-US" dirty="0"/>
           </a:p>
@@ -8153,7 +8155,7 @@
           <a:p>
             <a:fld id="{EB712588-04B1-427B-82EE-E8DB90309F08}" type="datetimeFigureOut">
               <a:rPr lang="en-US" dirty="0"/>
-              <a:t>16.01.2018</a:t>
+              <a:t>01.02.2018</a:t>
             </a:fld>
             <a:endParaRPr lang="en-US" dirty="0"/>
           </a:p>
@@ -8523,7 +8525,7 @@
             <a:fld id="{B61BEF0D-F0BB-DE4B-95CE-6DB70DBA9567}" type="datetimeFigureOut">
               <a:rPr lang="en-US" dirty="0"/>
               <a:pPr/>
-              <a:t>16.01.2018</a:t>
+              <a:t>01.02.2018</a:t>
             </a:fld>
             <a:endParaRPr lang="en-US" dirty="0"/>
           </a:p>
@@ -8643,7 +8645,7 @@
             <a:fld id="{B61BEF0D-F0BB-DE4B-95CE-6DB70DBA9567}" type="datetimeFigureOut">
               <a:rPr lang="en-US" dirty="0"/>
               <a:pPr/>
-              <a:t>16.01.2018</a:t>
+              <a:t>01.02.2018</a:t>
             </a:fld>
             <a:endParaRPr lang="en-US" dirty="0"/>
           </a:p>
@@ -8735,7 +8737,7 @@
             <a:fld id="{B61BEF0D-F0BB-DE4B-95CE-6DB70DBA9567}" type="datetimeFigureOut">
               <a:rPr lang="en-US" dirty="0"/>
               <a:pPr/>
-              <a:t>16.01.2018</a:t>
+              <a:t>01.02.2018</a:t>
             </a:fld>
             <a:endParaRPr lang="en-US" dirty="0"/>
           </a:p>
@@ -8986,7 +8988,7 @@
           <a:p>
             <a:fld id="{42A54C80-263E-416B-A8E0-580EDEADCBDC}" type="datetimeFigureOut">
               <a:rPr lang="en-US" dirty="0"/>
-              <a:t>16.01.2018</a:t>
+              <a:t>01.02.2018</a:t>
             </a:fld>
             <a:endParaRPr lang="en-US" dirty="0"/>
           </a:p>
@@ -9245,7 +9247,7 @@
             <a:fld id="{B61BEF0D-F0BB-DE4B-95CE-6DB70DBA9567}" type="datetimeFigureOut">
               <a:rPr lang="en-US" dirty="0"/>
               <a:pPr/>
-              <a:t>16.01.2018</a:t>
+              <a:t>01.02.2018</a:t>
             </a:fld>
             <a:endParaRPr lang="en-US" dirty="0"/>
           </a:p>
@@ -9987,7 +9989,7 @@
             <a:fld id="{B61BEF0D-F0BB-DE4B-95CE-6DB70DBA9567}" type="datetimeFigureOut">
               <a:rPr lang="en-US" dirty="0"/>
               <a:pPr/>
-              <a:t>16.01.2018</a:t>
+              <a:t>01.02.2018</a:t>
             </a:fld>
             <a:endParaRPr lang="en-US" dirty="0"/>
           </a:p>
@@ -17675,6 +17677,169 @@
           <p:cNvPr id="2" name="Title 1">
             <a:extLst>
               <a:ext uri="{FF2B5EF4-FFF2-40B4-BE49-F238E27FC236}">
+                <a16:creationId xmlns:a16="http://schemas.microsoft.com/office/drawing/2014/main" id="{2AAE25C5-EDF3-47F7-9ED4-53D45C7A1D16}"/>
+              </a:ext>
+            </a:extLst>
+          </p:cNvPr>
+          <p:cNvSpPr>
+            <a:spLocks noGrp="1"/>
+          </p:cNvSpPr>
+          <p:nvPr>
+            <p:ph type="title"/>
+          </p:nvPr>
+        </p:nvSpPr>
+        <p:spPr/>
+        <p:txBody>
+          <a:bodyPr/>
+          <a:lstStyle/>
+          <a:p>
+            <a:r>
+              <a:rPr lang="en-US" dirty="0"/>
+              <a:t>Spring Netflix cloud</a:t>
+            </a:r>
+          </a:p>
+        </p:txBody>
+      </p:sp>
+      <p:sp>
+        <p:nvSpPr>
+          <p:cNvPr id="3" name="Content Placeholder 2">
+            <a:extLst>
+              <a:ext uri="{FF2B5EF4-FFF2-40B4-BE49-F238E27FC236}">
+                <a16:creationId xmlns:a16="http://schemas.microsoft.com/office/drawing/2014/main" id="{C9EE7DE8-265B-4FF3-A042-DD89A41E50A2}"/>
+              </a:ext>
+            </a:extLst>
+          </p:cNvPr>
+          <p:cNvSpPr>
+            <a:spLocks noGrp="1"/>
+          </p:cNvSpPr>
+          <p:nvPr>
+            <p:ph idx="1"/>
+          </p:nvPr>
+        </p:nvSpPr>
+        <p:spPr>
+          <a:xfrm>
+            <a:off x="677334" y="1610687"/>
+            <a:ext cx="8596668" cy="4430676"/>
+          </a:xfrm>
+        </p:spPr>
+        <p:txBody>
+          <a:bodyPr/>
+          <a:lstStyle/>
+          <a:p>
+            <a:r>
+              <a:rPr lang="en-US" dirty="0"/>
+              <a:t>Should provide easy developing of microservice architecture</a:t>
+            </a:r>
+          </a:p>
+          <a:p>
+            <a:r>
+              <a:rPr lang="en-US" dirty="0"/>
+              <a:t>Netflix alternatives: </a:t>
+            </a:r>
+            <a:r>
+              <a:rPr lang="en-US" dirty="0" err="1"/>
+              <a:t>Cloudfoundry</a:t>
+            </a:r>
+            <a:r>
+              <a:rPr lang="en-US" dirty="0"/>
+              <a:t>, Consul</a:t>
+            </a:r>
+          </a:p>
+          <a:p>
+            <a:r>
+              <a:rPr lang="en-US" dirty="0"/>
+              <a:t>The main components:</a:t>
+            </a:r>
+          </a:p>
+          <a:p>
+            <a:pPr lvl="1"/>
+            <a:r>
+              <a:rPr lang="en-US" dirty="0"/>
+              <a:t>Configuration server – provides centralized configuration  for all microservices</a:t>
+            </a:r>
+          </a:p>
+          <a:p>
+            <a:pPr lvl="1"/>
+            <a:r>
+              <a:rPr lang="en-US" dirty="0"/>
+              <a:t>Eureka – discovery server/client exposes services to each other.</a:t>
+            </a:r>
+          </a:p>
+          <a:p>
+            <a:pPr lvl="1"/>
+            <a:r>
+              <a:rPr lang="en-US" dirty="0" err="1"/>
+              <a:t>Zuul</a:t>
+            </a:r>
+            <a:r>
+              <a:rPr lang="en-US" dirty="0"/>
+              <a:t> -  embedded and programable server.</a:t>
+            </a:r>
+          </a:p>
+          <a:p>
+            <a:pPr lvl="1"/>
+            <a:r>
+              <a:rPr lang="en-US" dirty="0"/>
+              <a:t>Feign – microservice clients</a:t>
+            </a:r>
+          </a:p>
+          <a:p>
+            <a:pPr lvl="1"/>
+            <a:r>
+              <a:rPr lang="en-US" dirty="0"/>
+              <a:t>Ribbon – </a:t>
+            </a:r>
+            <a:r>
+              <a:rPr lang="en-US" dirty="0" err="1"/>
+              <a:t>interservice</a:t>
+            </a:r>
+            <a:r>
+              <a:rPr lang="en-US" dirty="0"/>
+              <a:t> communication and  load </a:t>
+            </a:r>
+            <a:r>
+              <a:rPr lang="en-US"/>
+              <a:t>balansing</a:t>
+            </a:r>
+            <a:endParaRPr lang="en-US" dirty="0"/>
+          </a:p>
+        </p:txBody>
+      </p:sp>
+    </p:spTree>
+    <p:extLst>
+      <p:ext uri="{BB962C8B-B14F-4D97-AF65-F5344CB8AC3E}">
+        <p14:creationId xmlns:p14="http://schemas.microsoft.com/office/powerpoint/2010/main" val="2104967724"/>
+      </p:ext>
+    </p:extLst>
+  </p:cSld>
+  <p:clrMapOvr>
+    <a:masterClrMapping/>
+  </p:clrMapOvr>
+</p:sld>
+</file>
+
+<file path=ppt/slides/slide33.xml><?xml version="1.0" encoding="utf-8"?>
+<p:sld xmlns:a="http://schemas.openxmlformats.org/drawingml/2006/main" xmlns:r="http://schemas.openxmlformats.org/officeDocument/2006/relationships" xmlns:p="http://schemas.openxmlformats.org/presentationml/2006/main">
+  <p:cSld>
+    <p:spTree>
+      <p:nvGrpSpPr>
+        <p:cNvPr id="1" name=""/>
+        <p:cNvGrpSpPr/>
+        <p:nvPr/>
+      </p:nvGrpSpPr>
+      <p:grpSpPr>
+        <a:xfrm>
+          <a:off x="0" y="0"/>
+          <a:ext cx="0" cy="0"/>
+          <a:chOff x="0" y="0"/>
+          <a:chExt cx="0" cy="0"/>
+        </a:xfrm>
+      </p:grpSpPr>
+      <p:sp>
+        <p:nvSpPr>
+          <p:cNvPr id="2" name="Title 1">
+            <a:extLst>
+              <a:ext uri="{FF2B5EF4-FFF2-40B4-BE49-F238E27FC236}">
                 <a16:creationId xmlns:a16="http://schemas.microsoft.com/office/drawing/2014/main" id="{42AACF40-1801-4FE7-8352-C5D6505C283B}"/>
               </a:ext>
             </a:extLst>
@@ -17742,7 +17907,7 @@
 </p:sld>
 </file>
 
-<file path=ppt/slides/slide33.xml><?xml version="1.0" encoding="utf-8"?>
+<file path=ppt/slides/slide34.xml><?xml version="1.0" encoding="utf-8"?>
 <p:sld xmlns:a="http://schemas.openxmlformats.org/drawingml/2006/main" xmlns:r="http://schemas.openxmlformats.org/officeDocument/2006/relationships" xmlns:p="http://schemas.openxmlformats.org/presentationml/2006/main">
   <p:cSld>
     <p:spTree>

</xml_diff>

<commit_message>
add new topic, and small class changes
</commit_message>
<xml_diff>
--- a/documentation/SpringBoot.pptx
+++ b/documentation/SpringBoot.pptx
@@ -5590,7 +5590,7 @@
             <a:fld id="{B61BEF0D-F0BB-DE4B-95CE-6DB70DBA9567}" type="datetimeFigureOut">
               <a:rPr lang="en-US" dirty="0"/>
               <a:pPr/>
-              <a:t>02.03.2018</a:t>
+              <a:t>08.03.2018</a:t>
             </a:fld>
             <a:endParaRPr lang="en-US" dirty="0"/>
           </a:p>
@@ -5838,7 +5838,7 @@
             <a:fld id="{B61BEF0D-F0BB-DE4B-95CE-6DB70DBA9567}" type="datetimeFigureOut">
               <a:rPr lang="en-US" dirty="0"/>
               <a:pPr/>
-              <a:t>02.03.2018</a:t>
+              <a:t>08.03.2018</a:t>
             </a:fld>
             <a:endParaRPr lang="en-US" dirty="0"/>
           </a:p>
@@ -6149,7 +6149,7 @@
             <a:fld id="{B61BEF0D-F0BB-DE4B-95CE-6DB70DBA9567}" type="datetimeFigureOut">
               <a:rPr lang="en-US" dirty="0"/>
               <a:pPr/>
-              <a:t>02.03.2018</a:t>
+              <a:t>08.03.2018</a:t>
             </a:fld>
             <a:endParaRPr lang="en-US" dirty="0"/>
           </a:p>
@@ -6473,7 +6473,7 @@
             <a:fld id="{B61BEF0D-F0BB-DE4B-95CE-6DB70DBA9567}" type="datetimeFigureOut">
               <a:rPr lang="en-US" dirty="0"/>
               <a:pPr/>
-              <a:t>02.03.2018</a:t>
+              <a:t>08.03.2018</a:t>
             </a:fld>
             <a:endParaRPr lang="en-US" dirty="0"/>
           </a:p>
@@ -6784,7 +6784,7 @@
             <a:fld id="{B61BEF0D-F0BB-DE4B-95CE-6DB70DBA9567}" type="datetimeFigureOut">
               <a:rPr lang="en-US" dirty="0"/>
               <a:pPr/>
-              <a:t>02.03.2018</a:t>
+              <a:t>08.03.2018</a:t>
             </a:fld>
             <a:endParaRPr lang="en-US" dirty="0"/>
           </a:p>
@@ -7168,7 +7168,7 @@
             <a:fld id="{B61BEF0D-F0BB-DE4B-95CE-6DB70DBA9567}" type="datetimeFigureOut">
               <a:rPr lang="en-US" dirty="0"/>
               <a:pPr/>
-              <a:t>02.03.2018</a:t>
+              <a:t>08.03.2018</a:t>
             </a:fld>
             <a:endParaRPr lang="en-US" dirty="0"/>
           </a:p>
@@ -7334,7 +7334,7 @@
           <a:p>
             <a:fld id="{55C6B4A9-1611-4792-9094-5F34BCA07E0B}" type="datetimeFigureOut">
               <a:rPr lang="en-US" dirty="0"/>
-              <a:t>02.03.2018</a:t>
+              <a:t>08.03.2018</a:t>
             </a:fld>
             <a:endParaRPr lang="en-US" dirty="0"/>
           </a:p>
@@ -7510,7 +7510,7 @@
             <a:fld id="{B61BEF0D-F0BB-DE4B-95CE-6DB70DBA9567}" type="datetimeFigureOut">
               <a:rPr lang="en-US" dirty="0"/>
               <a:pPr/>
-              <a:t>02.03.2018</a:t>
+              <a:t>08.03.2018</a:t>
             </a:fld>
             <a:endParaRPr lang="en-US" dirty="0"/>
           </a:p>
@@ -7683,7 +7683,7 @@
             <a:fld id="{B61BEF0D-F0BB-DE4B-95CE-6DB70DBA9567}" type="datetimeFigureOut">
               <a:rPr lang="en-US" dirty="0"/>
               <a:pPr/>
-              <a:t>02.03.2018</a:t>
+              <a:t>08.03.2018</a:t>
             </a:fld>
             <a:endParaRPr lang="en-US" dirty="0"/>
           </a:p>
@@ -7927,7 +7927,7 @@
             <a:fld id="{B61BEF0D-F0BB-DE4B-95CE-6DB70DBA9567}" type="datetimeFigureOut">
               <a:rPr lang="en-US" dirty="0"/>
               <a:pPr/>
-              <a:t>02.03.2018</a:t>
+              <a:t>08.03.2018</a:t>
             </a:fld>
             <a:endParaRPr lang="en-US" dirty="0"/>
           </a:p>
@@ -8155,7 +8155,7 @@
           <a:p>
             <a:fld id="{EB712588-04B1-427B-82EE-E8DB90309F08}" type="datetimeFigureOut">
               <a:rPr lang="en-US" dirty="0"/>
-              <a:t>02.03.2018</a:t>
+              <a:t>08.03.2018</a:t>
             </a:fld>
             <a:endParaRPr lang="en-US" dirty="0"/>
           </a:p>
@@ -8525,7 +8525,7 @@
             <a:fld id="{B61BEF0D-F0BB-DE4B-95CE-6DB70DBA9567}" type="datetimeFigureOut">
               <a:rPr lang="en-US" dirty="0"/>
               <a:pPr/>
-              <a:t>02.03.2018</a:t>
+              <a:t>08.03.2018</a:t>
             </a:fld>
             <a:endParaRPr lang="en-US" dirty="0"/>
           </a:p>
@@ -8645,7 +8645,7 @@
             <a:fld id="{B61BEF0D-F0BB-DE4B-95CE-6DB70DBA9567}" type="datetimeFigureOut">
               <a:rPr lang="en-US" dirty="0"/>
               <a:pPr/>
-              <a:t>02.03.2018</a:t>
+              <a:t>08.03.2018</a:t>
             </a:fld>
             <a:endParaRPr lang="en-US" dirty="0"/>
           </a:p>
@@ -8737,7 +8737,7 @@
             <a:fld id="{B61BEF0D-F0BB-DE4B-95CE-6DB70DBA9567}" type="datetimeFigureOut">
               <a:rPr lang="en-US" dirty="0"/>
               <a:pPr/>
-              <a:t>02.03.2018</a:t>
+              <a:t>08.03.2018</a:t>
             </a:fld>
             <a:endParaRPr lang="en-US" dirty="0"/>
           </a:p>
@@ -8988,7 +8988,7 @@
           <a:p>
             <a:fld id="{42A54C80-263E-416B-A8E0-580EDEADCBDC}" type="datetimeFigureOut">
               <a:rPr lang="en-US" dirty="0"/>
-              <a:t>02.03.2018</a:t>
+              <a:t>08.03.2018</a:t>
             </a:fld>
             <a:endParaRPr lang="en-US" dirty="0"/>
           </a:p>
@@ -9247,7 +9247,7 @@
             <a:fld id="{B61BEF0D-F0BB-DE4B-95CE-6DB70DBA9567}" type="datetimeFigureOut">
               <a:rPr lang="en-US" dirty="0"/>
               <a:pPr/>
-              <a:t>02.03.2018</a:t>
+              <a:t>08.03.2018</a:t>
             </a:fld>
             <a:endParaRPr lang="en-US" dirty="0"/>
           </a:p>
@@ -9989,7 +9989,7 @@
             <a:fld id="{B61BEF0D-F0BB-DE4B-95CE-6DB70DBA9567}" type="datetimeFigureOut">
               <a:rPr lang="en-US" dirty="0"/>
               <a:pPr/>
-              <a:t>02.03.2018</a:t>
+              <a:t>08.03.2018</a:t>
             </a:fld>
             <a:endParaRPr lang="en-US" dirty="0"/>
           </a:p>
@@ -17592,12 +17592,8 @@
           <a:p>
             <a:pPr lvl="1" fontAlgn="base"/>
             <a:r>
-              <a:rPr lang="en-US" dirty="0" err="1"/>
-              <a:t>Hashe</a:t>
-            </a:r>
-            <a:r>
-              <a:rPr lang="en-US" dirty="0"/>
-              <a:t> - is map between key and string value. HSET, HGET, HINCRBY, </a:t>
+              <a:rPr lang="en-US" dirty="0"/>
+              <a:t>Hash - is map between key and string value. HSET, HGET, HINCRBY, </a:t>
             </a:r>
             <a:r>
               <a:rPr lang="en-US" u="sng" dirty="0" err="1">
@@ -17628,13 +17624,8 @@
             <a:pPr lvl="1" fontAlgn="base"/>
             <a:r>
               <a:rPr lang="en-US" dirty="0"/>
-              <a:t>Collections up to 2^32-1 ( more than 4 billion </a:t>
-            </a:r>
-            <a:r>
-              <a:rPr lang="en-US"/>
-              <a:t>) elements</a:t>
-            </a:r>
-            <a:endParaRPr lang="en-US" dirty="0"/>
+              <a:t>Collections up to 2^32-1 ( more than 4 billion ) elements</a:t>
+            </a:r>
           </a:p>
           <a:p>
             <a:pPr lvl="1"/>

</xml_diff>